<commit_message>
merged input, final version
</commit_message>
<xml_diff>
--- a/118/IEPG/draft-netana-iepg-nmrg-network-anomaly-semantics-01.pptx
+++ b/118/IEPG/draft-netana-iepg-nmrg-network-anomaly-semantics-01.pptx
@@ -15,9 +15,9 @@
     <p:sldId id="2145706226" r:id="rId6"/>
     <p:sldId id="2145706234" r:id="rId7"/>
     <p:sldId id="2145706236" r:id="rId8"/>
-    <p:sldId id="2145706227" r:id="rId9"/>
-    <p:sldId id="2145706232" r:id="rId10"/>
-    <p:sldId id="2145706233" r:id="rId11"/>
+    <p:sldId id="2145706232" r:id="rId9"/>
+    <p:sldId id="2145706233" r:id="rId10"/>
+    <p:sldId id="2145706227" r:id="rId11"/>
     <p:sldId id="26425" r:id="rId12"/>
     <p:sldId id="2145706235" r:id="rId13"/>
     <p:sldId id="26415" r:id="rId14"/>
@@ -2220,7 +2220,7 @@
           <a:p>
             <a:fld id="{E5E705E9-673F-4AC4-B29E-A7B26F3B8523}" type="datetimeFigureOut">
               <a:rPr lang="de-CH" smtClean="0"/>
-              <a:t>03.11.2023</a:t>
+              <a:t>04.11.2023</a:t>
             </a:fld>
             <a:endParaRPr lang="de-CH"/>
           </a:p>
@@ -2637,7 +2637,7 @@
           <a:p>
             <a:fld id="{9E9B238C-2335-4007-98C9-471C02CC43B6}" type="datetimeFigureOut">
               <a:rPr lang="de-CH" smtClean="0"/>
-              <a:t>03.11.2023</a:t>
+              <a:t>04.11.2023</a:t>
             </a:fld>
             <a:endParaRPr lang="de-CH"/>
           </a:p>
@@ -2837,7 +2837,7 @@
           <a:p>
             <a:fld id="{9E9B238C-2335-4007-98C9-471C02CC43B6}" type="datetimeFigureOut">
               <a:rPr lang="de-CH" smtClean="0"/>
-              <a:t>03.11.2023</a:t>
+              <a:t>04.11.2023</a:t>
             </a:fld>
             <a:endParaRPr lang="de-CH"/>
           </a:p>
@@ -3047,7 +3047,7 @@
           <a:p>
             <a:fld id="{9E9B238C-2335-4007-98C9-471C02CC43B6}" type="datetimeFigureOut">
               <a:rPr lang="de-CH" smtClean="0"/>
-              <a:t>03.11.2023</a:t>
+              <a:t>04.11.2023</a:t>
             </a:fld>
             <a:endParaRPr lang="de-CH"/>
           </a:p>
@@ -3476,7 +3476,7 @@
           <a:p>
             <a:fld id="{9E9B238C-2335-4007-98C9-471C02CC43B6}" type="datetimeFigureOut">
               <a:rPr lang="de-CH" smtClean="0"/>
-              <a:t>03.11.2023</a:t>
+              <a:t>04.11.2023</a:t>
             </a:fld>
             <a:endParaRPr lang="de-CH"/>
           </a:p>
@@ -3752,7 +3752,7 @@
           <a:p>
             <a:fld id="{9E9B238C-2335-4007-98C9-471C02CC43B6}" type="datetimeFigureOut">
               <a:rPr lang="de-CH" smtClean="0"/>
-              <a:t>03.11.2023</a:t>
+              <a:t>04.11.2023</a:t>
             </a:fld>
             <a:endParaRPr lang="de-CH"/>
           </a:p>
@@ -4020,7 +4020,7 @@
           <a:p>
             <a:fld id="{9E9B238C-2335-4007-98C9-471C02CC43B6}" type="datetimeFigureOut">
               <a:rPr lang="de-CH" smtClean="0"/>
-              <a:t>03.11.2023</a:t>
+              <a:t>04.11.2023</a:t>
             </a:fld>
             <a:endParaRPr lang="de-CH"/>
           </a:p>
@@ -4435,7 +4435,7 @@
           <a:p>
             <a:fld id="{9E9B238C-2335-4007-98C9-471C02CC43B6}" type="datetimeFigureOut">
               <a:rPr lang="de-CH" smtClean="0"/>
-              <a:t>03.11.2023</a:t>
+              <a:t>04.11.2023</a:t>
             </a:fld>
             <a:endParaRPr lang="de-CH"/>
           </a:p>
@@ -4577,7 +4577,7 @@
           <a:p>
             <a:fld id="{9E9B238C-2335-4007-98C9-471C02CC43B6}" type="datetimeFigureOut">
               <a:rPr lang="de-CH" smtClean="0"/>
-              <a:t>03.11.2023</a:t>
+              <a:t>04.11.2023</a:t>
             </a:fld>
             <a:endParaRPr lang="de-CH"/>
           </a:p>
@@ -4690,7 +4690,7 @@
           <a:p>
             <a:fld id="{9E9B238C-2335-4007-98C9-471C02CC43B6}" type="datetimeFigureOut">
               <a:rPr lang="de-CH" smtClean="0"/>
-              <a:t>03.11.2023</a:t>
+              <a:t>04.11.2023</a:t>
             </a:fld>
             <a:endParaRPr lang="de-CH"/>
           </a:p>
@@ -5003,7 +5003,7 @@
           <a:p>
             <a:fld id="{9E9B238C-2335-4007-98C9-471C02CC43B6}" type="datetimeFigureOut">
               <a:rPr lang="de-CH" smtClean="0"/>
-              <a:t>03.11.2023</a:t>
+              <a:t>04.11.2023</a:t>
             </a:fld>
             <a:endParaRPr lang="de-CH"/>
           </a:p>
@@ -5292,7 +5292,7 @@
           <a:p>
             <a:fld id="{9E9B238C-2335-4007-98C9-471C02CC43B6}" type="datetimeFigureOut">
               <a:rPr lang="de-CH" smtClean="0"/>
-              <a:t>03.11.2023</a:t>
+              <a:t>04.11.2023</a:t>
             </a:fld>
             <a:endParaRPr lang="de-CH"/>
           </a:p>
@@ -5535,7 +5535,7 @@
           <a:p>
             <a:fld id="{9E9B238C-2335-4007-98C9-471C02CC43B6}" type="datetimeFigureOut">
               <a:rPr lang="de-CH" smtClean="0"/>
-              <a:t>03.11.2023</a:t>
+              <a:t>04.11.2023</a:t>
             </a:fld>
             <a:endParaRPr lang="de-CH"/>
           </a:p>
@@ -6048,7 +6048,7 @@
                   </a:schemeClr>
                 </a:solidFill>
               </a:rPr>
-              <a:t>Helps to test and validate outlier detection, supports</a:t>
+              <a:t>Helps to test, validate and compare outlier detection, supports</a:t>
             </a:r>
             <a:br>
               <a:rPr lang="en-US" sz="2800" dirty="0">
@@ -6421,7 +6421,7 @@
               <a:rPr lang="de-CH" sz="3800" dirty="0">
                 <a:latin typeface="+mj-lt"/>
               </a:rPr>
-              <a:t>01. </a:t>
+              <a:t>04. </a:t>
             </a:r>
             <a:r>
               <a:rPr lang="de-CH" sz="3800" dirty="0">
@@ -6521,8 +6521,8 @@
         </p:nvSpPr>
         <p:spPr bwMode="black">
           <a:xfrm>
-            <a:off x="970961" y="2011679"/>
-            <a:ext cx="9486450" cy="4171630"/>
+            <a:off x="960120" y="2011679"/>
+            <a:ext cx="6364224" cy="4171630"/>
           </a:xfrm>
           <a:prstGeom prst="rect">
             <a:avLst/>
@@ -6728,11 +6728,11 @@
                   <a:srgbClr val="FF0000"/>
                 </a:solidFill>
               </a:rPr>
-              <a:t>Network Operators: </a:t>
+              <a:t>Global outliers:  </a:t>
             </a:r>
             <a:r>
               <a:rPr lang="en-US" dirty="0"/>
-              <a:t>Do you agree that today’s actions; traffic is dropped, path is withdrawn and interface down, are always exposed through Network Telemetry. But reasons and causes, dropped due to unreachable next-hop, withdrawn due to peer down, interface down due to missing signal, are rarely exposed to telemetry  would be most interesting?</a:t>
+              <a:t>An outlier is considered "global" if its behavior is outside the entirety of the considered data set.</a:t>
             </a:r>
           </a:p>
           <a:p>
@@ -6742,11 +6742,11 @@
                   <a:srgbClr val="FF0000"/>
                 </a:solidFill>
               </a:rPr>
-              <a:t>Network Vendors: </a:t>
+              <a:t>Contextual outliers:  </a:t>
             </a:r>
             <a:r>
               <a:rPr lang="en-US" dirty="0"/>
-              <a:t>Is the assumption correct that a when network service process, routing process and withdrawing a path occur, most of the time the vendor knows why it acts that way, and could potential make this reason and cause information available?</a:t>
+              <a:t>An outlier is considered "contextual" if its behavior is within a normal (expected) range, but it would not be expected based on some context.  Context can be defined as a function of multiple parameters, such as time, location, etc.</a:t>
             </a:r>
           </a:p>
           <a:p>
@@ -6756,26 +6756,113 @@
                   <a:srgbClr val="FF0000"/>
                 </a:solidFill>
               </a:rPr>
-              <a:t>Academia: </a:t>
+              <a:t>Collective outliers:  </a:t>
             </a:r>
             <a:r>
               <a:rPr lang="en-US" dirty="0"/>
-              <a:t>Would it help if network operators would provide well defined labeled operational and analytical data to enable and validate their research?</a:t>
-            </a:r>
-          </a:p>
-          <a:p>
-            <a:r>
-              <a:rPr lang="en-US" b="1" dirty="0">
+              <a:t>An outlier is considered "collective" if the behavior of each single data point that are part of the anomaly are within expected ranges (so they are not anomalous, it’s either a contextual or a global sense), but the group taking all the data points together, is.</a:t>
+            </a:r>
+          </a:p>
+        </p:txBody>
+      </p:sp>
+      <p:sp>
+        <p:nvSpPr>
+          <p:cNvPr id="18" name="TextBox 17">
+            <a:extLst>
+              <a:ext uri="{FF2B5EF4-FFF2-40B4-BE49-F238E27FC236}">
+                <a16:creationId xmlns:a16="http://schemas.microsoft.com/office/drawing/2014/main" id="{B283EDB4-CFDF-D6B9-8AF9-9CFA563360E3}"/>
+              </a:ext>
+            </a:extLst>
+          </p:cNvPr>
+          <p:cNvSpPr txBox="1"/>
+          <p:nvPr/>
+        </p:nvSpPr>
+        <p:spPr>
+          <a:xfrm>
+            <a:off x="7589520" y="2365150"/>
+            <a:ext cx="4404495" cy="3323987"/>
+          </a:xfrm>
+          <a:prstGeom prst="rect">
+            <a:avLst/>
+          </a:prstGeom>
+          <a:noFill/>
+        </p:spPr>
+        <p:txBody>
+          <a:bodyPr wrap="square">
+            <a:spAutoFit/>
+          </a:bodyPr>
+          <a:lstStyle/>
+          <a:p>
+            <a:pPr algn="ctr"/>
+            <a:r>
+              <a:rPr lang="en-US" sz="3000" b="1" dirty="0">
+                <a:latin typeface="+mj-lt"/>
+              </a:rPr>
+              <a:t>« </a:t>
+            </a:r>
+            <a:r>
+              <a:rPr lang="en-US" sz="3000" b="1" dirty="0">
                 <a:solidFill>
                   <a:srgbClr val="FF0000"/>
                 </a:solidFill>
-              </a:rPr>
-              <a:t>Everybody: </a:t>
-            </a:r>
-            <a:r>
-              <a:rPr lang="en-US" dirty="0"/>
-              <a:t>Should these symptoms be clearly described and standardized for a common terminology so that operators, researchers and anomaly detection systems alike understand their meaning and learn and act accordingly?</a:t>
-            </a:r>
+                <a:latin typeface="+mj-lt"/>
+              </a:rPr>
+              <a:t>Collective outliers </a:t>
+            </a:r>
+            <a:r>
+              <a:rPr lang="en-US" sz="3000" b="1" dirty="0">
+                <a:latin typeface="+mj-lt"/>
+              </a:rPr>
+              <a:t>are important because networks are connected. Through </a:t>
+            </a:r>
+            <a:r>
+              <a:rPr lang="en-US" sz="3000" b="1" dirty="0">
+                <a:solidFill>
+                  <a:srgbClr val="FF0000"/>
+                </a:solidFill>
+                <a:latin typeface="+mj-lt"/>
+              </a:rPr>
+              <a:t>different planes interconnected</a:t>
+            </a:r>
+            <a:r>
+              <a:rPr lang="en-US" sz="3000" b="1" dirty="0">
+                <a:latin typeface="+mj-lt"/>
+              </a:rPr>
+              <a:t> symptoms </a:t>
+            </a:r>
+            <a:r>
+              <a:rPr lang="en-US" sz="3000" b="1" dirty="0">
+                <a:solidFill>
+                  <a:srgbClr val="FF0000"/>
+                </a:solidFill>
+                <a:latin typeface="+mj-lt"/>
+              </a:rPr>
+              <a:t>from various angles </a:t>
+            </a:r>
+            <a:r>
+              <a:rPr lang="en-US" sz="3000" b="1" dirty="0">
+                <a:latin typeface="+mj-lt"/>
+              </a:rPr>
+              <a:t>can be observed</a:t>
+            </a:r>
+            <a:r>
+              <a:rPr lang="en-US" sz="3000" b="1" dirty="0">
+                <a:solidFill>
+                  <a:schemeClr val="accent6"/>
+                </a:solidFill>
+                <a:latin typeface="+mj-lt"/>
+              </a:rPr>
+              <a:t> </a:t>
+            </a:r>
+            <a:r>
+              <a:rPr lang="de-CH" sz="3000" b="1" dirty="0">
+                <a:latin typeface="+mj-lt"/>
+              </a:rPr>
+              <a:t>»</a:t>
+            </a:r>
+            <a:endParaRPr lang="en-US" sz="3000" b="1" dirty="0">
+              <a:latin typeface="+mj-lt"/>
+            </a:endParaRPr>
           </a:p>
         </p:txBody>
       </p:sp>
@@ -6809,7 +6896,7 @@
           <a:p>
             <a:r>
               <a:rPr lang="en-US" sz="2800" b="1" dirty="0"/>
-              <a:t>Questions to the audience</a:t>
+              <a:t>Outliers in Anomaly Detection</a:t>
             </a:r>
             <a:br>
               <a:rPr lang="en-US" sz="3600" dirty="0"/>
@@ -6822,20 +6909,15 @@
                   </a:schemeClr>
                 </a:solidFill>
               </a:rPr>
-              <a:t>Do you care?</a:t>
-            </a:r>
-            <a:endParaRPr lang="en-US" sz="2700" dirty="0">
-              <a:solidFill>
-                <a:srgbClr val="FF0000"/>
-              </a:solidFill>
-            </a:endParaRPr>
+              <a:t>From global to contextual to collective</a:t>
+            </a:r>
           </a:p>
         </p:txBody>
       </p:sp>
     </p:spTree>
     <p:extLst>
       <p:ext uri="{BB962C8B-B14F-4D97-AF65-F5344CB8AC3E}">
-        <p14:creationId xmlns:p14="http://schemas.microsoft.com/office/powerpoint/2010/main" val="1609255611"/>
+        <p14:creationId xmlns:p14="http://schemas.microsoft.com/office/powerpoint/2010/main" val="4235116615"/>
       </p:ext>
     </p:extLst>
   </p:cSld>
@@ -6910,31 +6992,12 @@
                   <a:srgbClr val="FF0000"/>
                 </a:solidFill>
               </a:rPr>
-              <a:t>Plane</a:t>
+              <a:t>Tags</a:t>
             </a:r>
             <a:r>
               <a:rPr lang="en-US" sz="2000" dirty="0"/>
-              <a:t> describes in which network plane it was observed; Forwarding, Control or Management Plane.</a:t>
-            </a:r>
-          </a:p>
-          <a:p>
-            <a:r>
-              <a:rPr lang="en-US" sz="2000" b="1" dirty="0">
-                <a:solidFill>
-                  <a:srgbClr val="FF0000"/>
-                </a:solidFill>
-              </a:rPr>
-              <a:t>Outlier-Type </a:t>
-            </a:r>
-            <a:r>
-              <a:rPr lang="en-US" sz="2000" dirty="0"/>
-              <a:t>describes which type of outlier it is; Global, Contextual or Collective.</a:t>
-            </a:r>
-            <a:endParaRPr lang="en-US" sz="2000" b="1" dirty="0">
-              <a:solidFill>
-                <a:srgbClr val="FF0000"/>
-              </a:solidFill>
-            </a:endParaRPr>
+              <a:t> describes in which network plane, which action, reason and cause was observed.</a:t>
+            </a:r>
           </a:p>
           <a:p>
             <a:r>
@@ -6948,6 +7011,32 @@
             <a:r>
               <a:rPr lang="en-US" sz="2000" dirty="0"/>
               <a:t>describes the measurement pattern over time of the time series data.</a:t>
+            </a:r>
+          </a:p>
+          <a:p>
+            <a:r>
+              <a:rPr lang="en-US" sz="2000" b="1" dirty="0">
+                <a:solidFill>
+                  <a:srgbClr val="FF0000"/>
+                </a:solidFill>
+              </a:rPr>
+              <a:t>Source </a:t>
+            </a:r>
+            <a:r>
+              <a:rPr lang="en-US" sz="2000" dirty="0"/>
+              <a:t>describes which system </a:t>
+            </a:r>
+            <a:r>
+              <a:rPr lang="en-US" sz="2000" b="1" dirty="0">
+                <a:solidFill>
+                  <a:srgbClr val="FF0000"/>
+                </a:solidFill>
+              </a:rPr>
+              <a:t>observed</a:t>
+            </a:r>
+            <a:r>
+              <a:rPr lang="en-US" sz="2000" dirty="0"/>
+              <a:t> the outlier. A human or a network anomaly detection system.</a:t>
             </a:r>
           </a:p>
           <a:p>
@@ -6970,7 +7059,7 @@
         <p:spPr>
           <a:xfrm>
             <a:off x="806550" y="1676567"/>
-            <a:ext cx="4182687" cy="1958300"/>
+            <a:ext cx="4182687" cy="1065513"/>
           </a:xfrm>
           <a:prstGeom prst="rect">
             <a:avLst/>
@@ -7069,9 +7158,9 @@
           <p:nvPr/>
         </p:nvCxnSpPr>
         <p:spPr>
-          <a:xfrm>
-            <a:off x="5020884" y="2460264"/>
-            <a:ext cx="1247941" cy="562517"/>
+          <a:xfrm flipV="1">
+            <a:off x="5002030" y="4411091"/>
+            <a:ext cx="1232885" cy="1012805"/>
           </a:xfrm>
           <a:prstGeom prst="line">
             <a:avLst/>
@@ -7198,8 +7287,8 @@
         </p:nvSpPr>
         <p:spPr>
           <a:xfrm>
-            <a:off x="806550" y="3644174"/>
-            <a:ext cx="4182687" cy="1206499"/>
+            <a:off x="806550" y="2764921"/>
+            <a:ext cx="4182687" cy="460418"/>
           </a:xfrm>
           <a:prstGeom prst="rect">
             <a:avLst/>
@@ -7254,7 +7343,7 @@
         </p:nvSpPr>
         <p:spPr>
           <a:xfrm>
-            <a:off x="806549" y="2092751"/>
+            <a:off x="806549" y="5030177"/>
             <a:ext cx="4182687" cy="981600"/>
           </a:xfrm>
           <a:prstGeom prst="rect">
@@ -7310,7 +7399,7 @@
         </p:nvSpPr>
         <p:spPr>
           <a:xfrm>
-            <a:off x="806548" y="4859980"/>
+            <a:off x="806550" y="3225339"/>
             <a:ext cx="4182687" cy="1784660"/>
           </a:xfrm>
           <a:prstGeom prst="rect">
@@ -7367,9 +7456,9 @@
           <p:nvPr/>
         </p:nvCxnSpPr>
         <p:spPr>
-          <a:xfrm flipV="1">
-            <a:off x="4994210" y="3986326"/>
-            <a:ext cx="1274615" cy="305744"/>
+          <a:xfrm>
+            <a:off x="4994210" y="3015285"/>
+            <a:ext cx="1199200" cy="0"/>
           </a:xfrm>
           <a:prstGeom prst="line">
             <a:avLst/>
@@ -7411,8 +7500,8 @@
         </p:nvCxnSpPr>
         <p:spPr>
           <a:xfrm flipV="1">
-            <a:off x="5020885" y="4711337"/>
-            <a:ext cx="1247940" cy="493560"/>
+            <a:off x="5020885" y="3745309"/>
+            <a:ext cx="1214030" cy="47334"/>
           </a:xfrm>
           <a:prstGeom prst="line">
             <a:avLst/>
@@ -7453,7 +7542,7 @@
         <p:spPr>
           <a:xfrm>
             <a:off x="838198" y="1484344"/>
-            <a:ext cx="4373880" cy="5409109"/>
+            <a:ext cx="4373880" cy="4569264"/>
           </a:xfrm>
           <a:prstGeom prst="rect">
             <a:avLst/>
@@ -7637,29 +7726,7 @@
                 <a:ea typeface="Calibri" panose="020F0502020204030204" pitchFamily="34" charset="0"/>
                 <a:cs typeface="Courier New" panose="02070309020205020404" pitchFamily="49" charset="0"/>
               </a:rPr>
-              <a:t> description                string</a:t>
-            </a:r>
-          </a:p>
-          <a:p>
-            <a:pPr marL="0" marR="0">
-              <a:lnSpc>
-                <a:spcPct val="107000"/>
-              </a:lnSpc>
-              <a:spcBef>
-                <a:spcPts val="0"/>
-              </a:spcBef>
-              <a:spcAft>
-                <a:spcPts val="0"/>
-              </a:spcAft>
-            </a:pPr>
-            <a:r>
-              <a:rPr lang="en-US" sz="850" dirty="0">
-                <a:effectLst/>
-                <a:latin typeface="Courier New" panose="02070309020205020404" pitchFamily="49" charset="0"/>
-                <a:ea typeface="Calibri" panose="020F0502020204030204" pitchFamily="34" charset="0"/>
-                <a:cs typeface="Courier New" panose="02070309020205020404" pitchFamily="49" charset="0"/>
-              </a:rPr>
-              <a:t>    +--</a:t>
+              <a:t> event-id  </a:t>
             </a:r>
             <a:r>
               <a:rPr lang="en-US" sz="850" dirty="0" err="1">
@@ -7668,251 +7735,7 @@
                 <a:ea typeface="Calibri" panose="020F0502020204030204" pitchFamily="34" charset="0"/>
                 <a:cs typeface="Courier New" panose="02070309020205020404" pitchFamily="49" charset="0"/>
               </a:rPr>
-              <a:t>rw</a:t>
-            </a:r>
-            <a:r>
-              <a:rPr lang="en-US" sz="850" dirty="0">
-                <a:effectLst/>
-                <a:latin typeface="Courier New" panose="02070309020205020404" pitchFamily="49" charset="0"/>
-                <a:ea typeface="Calibri" panose="020F0502020204030204" pitchFamily="34" charset="0"/>
-                <a:cs typeface="Courier New" panose="02070309020205020404" pitchFamily="49" charset="0"/>
-              </a:rPr>
-              <a:t> (plane)?</a:t>
-            </a:r>
-          </a:p>
-          <a:p>
-            <a:pPr marL="0" marR="0">
-              <a:lnSpc>
-                <a:spcPct val="107000"/>
-              </a:lnSpc>
-              <a:spcBef>
-                <a:spcPts val="0"/>
-              </a:spcBef>
-              <a:spcAft>
-                <a:spcPts val="0"/>
-              </a:spcAft>
-            </a:pPr>
-            <a:r>
-              <a:rPr lang="en-US" sz="850" dirty="0">
-                <a:effectLst/>
-                <a:latin typeface="Courier New" panose="02070309020205020404" pitchFamily="49" charset="0"/>
-                <a:ea typeface="Calibri" panose="020F0502020204030204" pitchFamily="34" charset="0"/>
-                <a:cs typeface="Courier New" panose="02070309020205020404" pitchFamily="49" charset="0"/>
-              </a:rPr>
-              <a:t>    |  +--:(forwarding-plane)</a:t>
-            </a:r>
-          </a:p>
-          <a:p>
-            <a:pPr marL="0" marR="0">
-              <a:lnSpc>
-                <a:spcPct val="107000"/>
-              </a:lnSpc>
-              <a:spcBef>
-                <a:spcPts val="0"/>
-              </a:spcBef>
-              <a:spcAft>
-                <a:spcPts val="0"/>
-              </a:spcAft>
-            </a:pPr>
-            <a:r>
-              <a:rPr lang="en-US" sz="850" dirty="0">
-                <a:effectLst/>
-                <a:latin typeface="Courier New" panose="02070309020205020404" pitchFamily="49" charset="0"/>
-                <a:ea typeface="Calibri" panose="020F0502020204030204" pitchFamily="34" charset="0"/>
-                <a:cs typeface="Courier New" panose="02070309020205020404" pitchFamily="49" charset="0"/>
-              </a:rPr>
-              <a:t>    |  |  +--</a:t>
-            </a:r>
-            <a:r>
-              <a:rPr lang="en-US" sz="850" dirty="0" err="1">
-                <a:effectLst/>
-                <a:latin typeface="Courier New" panose="02070309020205020404" pitchFamily="49" charset="0"/>
-                <a:ea typeface="Calibri" panose="020F0502020204030204" pitchFamily="34" charset="0"/>
-                <a:cs typeface="Courier New" panose="02070309020205020404" pitchFamily="49" charset="0"/>
-              </a:rPr>
-              <a:t>rw</a:t>
-            </a:r>
-            <a:r>
-              <a:rPr lang="en-US" sz="850" dirty="0">
-                <a:effectLst/>
-                <a:latin typeface="Courier New" panose="02070309020205020404" pitchFamily="49" charset="0"/>
-                <a:ea typeface="Calibri" panose="020F0502020204030204" pitchFamily="34" charset="0"/>
-                <a:cs typeface="Courier New" panose="02070309020205020404" pitchFamily="49" charset="0"/>
-              </a:rPr>
-              <a:t> forwarding-plane     empty</a:t>
-            </a:r>
-          </a:p>
-          <a:p>
-            <a:pPr marL="0" marR="0">
-              <a:lnSpc>
-                <a:spcPct val="107000"/>
-              </a:lnSpc>
-              <a:spcBef>
-                <a:spcPts val="0"/>
-              </a:spcBef>
-              <a:spcAft>
-                <a:spcPts val="0"/>
-              </a:spcAft>
-            </a:pPr>
-            <a:r>
-              <a:rPr lang="en-US" sz="850" dirty="0">
-                <a:effectLst/>
-                <a:latin typeface="Courier New" panose="02070309020205020404" pitchFamily="49" charset="0"/>
-                <a:ea typeface="Calibri" panose="020F0502020204030204" pitchFamily="34" charset="0"/>
-                <a:cs typeface="Courier New" panose="02070309020205020404" pitchFamily="49" charset="0"/>
-              </a:rPr>
-              <a:t>    |  +--:(control-plane)</a:t>
-            </a:r>
-          </a:p>
-          <a:p>
-            <a:pPr marL="0" marR="0">
-              <a:lnSpc>
-                <a:spcPct val="107000"/>
-              </a:lnSpc>
-              <a:spcBef>
-                <a:spcPts val="0"/>
-              </a:spcBef>
-              <a:spcAft>
-                <a:spcPts val="0"/>
-              </a:spcAft>
-            </a:pPr>
-            <a:r>
-              <a:rPr lang="en-US" sz="850" dirty="0">
-                <a:effectLst/>
-                <a:latin typeface="Courier New" panose="02070309020205020404" pitchFamily="49" charset="0"/>
-                <a:ea typeface="Calibri" panose="020F0502020204030204" pitchFamily="34" charset="0"/>
-                <a:cs typeface="Courier New" panose="02070309020205020404" pitchFamily="49" charset="0"/>
-              </a:rPr>
-              <a:t>    |  |  +--</a:t>
-            </a:r>
-            <a:r>
-              <a:rPr lang="en-US" sz="850" dirty="0" err="1">
-                <a:effectLst/>
-                <a:latin typeface="Courier New" panose="02070309020205020404" pitchFamily="49" charset="0"/>
-                <a:ea typeface="Calibri" panose="020F0502020204030204" pitchFamily="34" charset="0"/>
-                <a:cs typeface="Courier New" panose="02070309020205020404" pitchFamily="49" charset="0"/>
-              </a:rPr>
-              <a:t>rw</a:t>
-            </a:r>
-            <a:r>
-              <a:rPr lang="en-US" sz="850" dirty="0">
-                <a:effectLst/>
-                <a:latin typeface="Courier New" panose="02070309020205020404" pitchFamily="49" charset="0"/>
-                <a:ea typeface="Calibri" panose="020F0502020204030204" pitchFamily="34" charset="0"/>
-                <a:cs typeface="Courier New" panose="02070309020205020404" pitchFamily="49" charset="0"/>
-              </a:rPr>
-              <a:t> control-plane        empty</a:t>
-            </a:r>
-          </a:p>
-          <a:p>
-            <a:pPr marL="0" marR="0">
-              <a:lnSpc>
-                <a:spcPct val="107000"/>
-              </a:lnSpc>
-              <a:spcBef>
-                <a:spcPts val="0"/>
-              </a:spcBef>
-              <a:spcAft>
-                <a:spcPts val="0"/>
-              </a:spcAft>
-            </a:pPr>
-            <a:r>
-              <a:rPr lang="en-US" sz="850" dirty="0">
-                <a:effectLst/>
-                <a:latin typeface="Courier New" panose="02070309020205020404" pitchFamily="49" charset="0"/>
-                <a:ea typeface="Calibri" panose="020F0502020204030204" pitchFamily="34" charset="0"/>
-                <a:cs typeface="Courier New" panose="02070309020205020404" pitchFamily="49" charset="0"/>
-              </a:rPr>
-              <a:t>    |  +--:(management-plane)</a:t>
-            </a:r>
-          </a:p>
-          <a:p>
-            <a:pPr marL="0" marR="0">
-              <a:lnSpc>
-                <a:spcPct val="107000"/>
-              </a:lnSpc>
-              <a:spcBef>
-                <a:spcPts val="0"/>
-              </a:spcBef>
-              <a:spcAft>
-                <a:spcPts val="0"/>
-              </a:spcAft>
-            </a:pPr>
-            <a:r>
-              <a:rPr lang="en-US" sz="850" dirty="0">
-                <a:effectLst/>
-                <a:latin typeface="Courier New" panose="02070309020205020404" pitchFamily="49" charset="0"/>
-                <a:ea typeface="Calibri" panose="020F0502020204030204" pitchFamily="34" charset="0"/>
-                <a:cs typeface="Courier New" panose="02070309020205020404" pitchFamily="49" charset="0"/>
-              </a:rPr>
-              <a:t>    |     +--</a:t>
-            </a:r>
-            <a:r>
-              <a:rPr lang="en-US" sz="850" dirty="0" err="1">
-                <a:effectLst/>
-                <a:latin typeface="Courier New" panose="02070309020205020404" pitchFamily="49" charset="0"/>
-                <a:ea typeface="Calibri" panose="020F0502020204030204" pitchFamily="34" charset="0"/>
-                <a:cs typeface="Courier New" panose="02070309020205020404" pitchFamily="49" charset="0"/>
-              </a:rPr>
-              <a:t>rw</a:t>
-            </a:r>
-            <a:r>
-              <a:rPr lang="en-US" sz="850" dirty="0">
-                <a:effectLst/>
-                <a:latin typeface="Courier New" panose="02070309020205020404" pitchFamily="49" charset="0"/>
-                <a:ea typeface="Calibri" panose="020F0502020204030204" pitchFamily="34" charset="0"/>
-                <a:cs typeface="Courier New" panose="02070309020205020404" pitchFamily="49" charset="0"/>
-              </a:rPr>
-              <a:t> management-plane     empty</a:t>
-            </a:r>
-          </a:p>
-          <a:p>
-            <a:pPr marL="0" marR="0">
-              <a:lnSpc>
-                <a:spcPct val="107000"/>
-              </a:lnSpc>
-              <a:spcBef>
-                <a:spcPts val="0"/>
-              </a:spcBef>
-              <a:spcAft>
-                <a:spcPts val="0"/>
-              </a:spcAft>
-            </a:pPr>
-            <a:r>
-              <a:rPr lang="en-US" sz="850" dirty="0">
-                <a:effectLst/>
-                <a:latin typeface="Courier New" panose="02070309020205020404" pitchFamily="49" charset="0"/>
-                <a:ea typeface="Calibri" panose="020F0502020204030204" pitchFamily="34" charset="0"/>
-                <a:cs typeface="Courier New" panose="02070309020205020404" pitchFamily="49" charset="0"/>
-              </a:rPr>
-              <a:t>    +--</a:t>
-            </a:r>
-            <a:r>
-              <a:rPr lang="en-US" sz="850" dirty="0" err="1">
-                <a:effectLst/>
-                <a:latin typeface="Courier New" panose="02070309020205020404" pitchFamily="49" charset="0"/>
-                <a:ea typeface="Calibri" panose="020F0502020204030204" pitchFamily="34" charset="0"/>
-                <a:cs typeface="Courier New" panose="02070309020205020404" pitchFamily="49" charset="0"/>
-              </a:rPr>
-              <a:t>rw</a:t>
-            </a:r>
-            <a:r>
-              <a:rPr lang="en-US" sz="850" dirty="0">
-                <a:effectLst/>
-                <a:latin typeface="Courier New" panose="02070309020205020404" pitchFamily="49" charset="0"/>
-                <a:ea typeface="Calibri" panose="020F0502020204030204" pitchFamily="34" charset="0"/>
-                <a:cs typeface="Courier New" panose="02070309020205020404" pitchFamily="49" charset="0"/>
-              </a:rPr>
-              <a:t> </a:t>
-            </a:r>
-            <a:r>
-              <a:rPr lang="en-US" sz="850" dirty="0" err="1">
-                <a:effectLst/>
-                <a:latin typeface="Courier New" panose="02070309020205020404" pitchFamily="49" charset="0"/>
-                <a:ea typeface="Calibri" panose="020F0502020204030204" pitchFamily="34" charset="0"/>
-                <a:cs typeface="Courier New" panose="02070309020205020404" pitchFamily="49" charset="0"/>
-              </a:rPr>
-              <a:t>condition?string</a:t>
+              <a:t>yang:uuid</a:t>
             </a:r>
             <a:endParaRPr lang="en-US" sz="850" dirty="0">
               <a:effectLst/>
@@ -7958,7 +7781,7 @@
                 <a:ea typeface="Calibri" panose="020F0502020204030204" pitchFamily="34" charset="0"/>
                 <a:cs typeface="Courier New" panose="02070309020205020404" pitchFamily="49" charset="0"/>
               </a:rPr>
-              <a:t> action?   string</a:t>
+              <a:t> description                string</a:t>
             </a:r>
           </a:p>
           <a:p>
@@ -7998,29 +7821,7 @@
                 <a:ea typeface="Calibri" panose="020F0502020204030204" pitchFamily="34" charset="0"/>
                 <a:cs typeface="Courier New" panose="02070309020205020404" pitchFamily="49" charset="0"/>
               </a:rPr>
-              <a:t> cause?    string</a:t>
-            </a:r>
-          </a:p>
-          <a:p>
-            <a:pPr marL="0" marR="0">
-              <a:lnSpc>
-                <a:spcPct val="107000"/>
-              </a:lnSpc>
-              <a:spcBef>
-                <a:spcPts val="0"/>
-              </a:spcBef>
-              <a:spcAft>
-                <a:spcPts val="0"/>
-              </a:spcAft>
-            </a:pPr>
-            <a:r>
-              <a:rPr lang="en-US" sz="850" dirty="0">
-                <a:effectLst/>
-                <a:latin typeface="Courier New" panose="02070309020205020404" pitchFamily="49" charset="0"/>
-                <a:ea typeface="Calibri" panose="020F0502020204030204" pitchFamily="34" charset="0"/>
-                <a:cs typeface="Courier New" panose="02070309020205020404" pitchFamily="49" charset="0"/>
-              </a:rPr>
-              <a:t>    +--</a:t>
+              <a:t> </a:t>
             </a:r>
             <a:r>
               <a:rPr lang="en-US" sz="850" dirty="0" err="1">
@@ -8029,43 +7830,7 @@
                 <a:ea typeface="Calibri" panose="020F0502020204030204" pitchFamily="34" charset="0"/>
                 <a:cs typeface="Courier New" panose="02070309020205020404" pitchFamily="49" charset="0"/>
               </a:rPr>
-              <a:t>rw</a:t>
-            </a:r>
-            <a:r>
-              <a:rPr lang="en-US" sz="850" dirty="0">
-                <a:effectLst/>
-                <a:latin typeface="Courier New" panose="02070309020205020404" pitchFamily="49" charset="0"/>
-                <a:ea typeface="Calibri" panose="020F0502020204030204" pitchFamily="34" charset="0"/>
-                <a:cs typeface="Courier New" panose="02070309020205020404" pitchFamily="49" charset="0"/>
-              </a:rPr>
-              <a:t> </a:t>
-            </a:r>
-            <a:r>
-              <a:rPr lang="en-US" sz="850" dirty="0" err="1">
-                <a:effectLst/>
-                <a:latin typeface="Courier New" panose="02070309020205020404" pitchFamily="49" charset="0"/>
-                <a:ea typeface="Calibri" panose="020F0502020204030204" pitchFamily="34" charset="0"/>
-                <a:cs typeface="Courier New" panose="02070309020205020404" pitchFamily="49" charset="0"/>
-              </a:rPr>
-              <a:t>entity_type</a:t>
-            </a:r>
-            <a:r>
-              <a:rPr lang="en-US" sz="850" dirty="0">
-                <a:effectLst/>
-                <a:latin typeface="Courier New" panose="02070309020205020404" pitchFamily="49" charset="0"/>
-                <a:ea typeface="Calibri" panose="020F0502020204030204" pitchFamily="34" charset="0"/>
-                <a:cs typeface="Courier New" panose="02070309020205020404" pitchFamily="49" charset="0"/>
-              </a:rPr>
-              <a:t>?               </a:t>
-            </a:r>
-            <a:r>
-              <a:rPr lang="en-US" sz="850" dirty="0" err="1">
-                <a:effectLst/>
-                <a:latin typeface="Courier New" panose="02070309020205020404" pitchFamily="49" charset="0"/>
-                <a:ea typeface="Calibri" panose="020F0502020204030204" pitchFamily="34" charset="0"/>
-                <a:cs typeface="Courier New" panose="02070309020205020404" pitchFamily="49" charset="0"/>
-              </a:rPr>
-              <a:t>yang:uuid</a:t>
+              <a:t>start-timeyang:date-and-time</a:t>
             </a:r>
             <a:endParaRPr lang="en-US" sz="850" dirty="0">
               <a:effectLst/>
@@ -8111,51 +7876,7 @@
                 <a:ea typeface="Calibri" panose="020F0502020204030204" pitchFamily="34" charset="0"/>
                 <a:cs typeface="Courier New" panose="02070309020205020404" pitchFamily="49" charset="0"/>
               </a:rPr>
-              <a:t> (outlier-type)?</a:t>
-            </a:r>
-          </a:p>
-          <a:p>
-            <a:pPr marL="0" marR="0">
-              <a:lnSpc>
-                <a:spcPct val="107000"/>
-              </a:lnSpc>
-              <a:spcBef>
-                <a:spcPts val="0"/>
-              </a:spcBef>
-              <a:spcAft>
-                <a:spcPts val="0"/>
-              </a:spcAft>
-            </a:pPr>
-            <a:r>
-              <a:rPr lang="en-US" sz="850" dirty="0">
-                <a:effectLst/>
-                <a:latin typeface="Courier New" panose="02070309020205020404" pitchFamily="49" charset="0"/>
-                <a:ea typeface="Calibri" panose="020F0502020204030204" pitchFamily="34" charset="0"/>
-                <a:cs typeface="Courier New" panose="02070309020205020404" pitchFamily="49" charset="0"/>
-              </a:rPr>
-              <a:t>    |  +--:(global)</a:t>
-            </a:r>
-          </a:p>
-          <a:p>
-            <a:pPr marL="0" marR="0">
-              <a:lnSpc>
-                <a:spcPct val="107000"/>
-              </a:lnSpc>
-              <a:spcBef>
-                <a:spcPts val="0"/>
-              </a:spcBef>
-              <a:spcAft>
-                <a:spcPts val="0"/>
-              </a:spcAft>
-            </a:pPr>
-            <a:r>
-              <a:rPr lang="en-US" sz="850" dirty="0">
-                <a:effectLst/>
-                <a:latin typeface="Courier New" panose="02070309020205020404" pitchFamily="49" charset="0"/>
-                <a:ea typeface="Calibri" panose="020F0502020204030204" pitchFamily="34" charset="0"/>
-                <a:cs typeface="Courier New" panose="02070309020205020404" pitchFamily="49" charset="0"/>
-              </a:rPr>
-              <a:t>    |  |  +--</a:t>
+              <a:t> end-time  </a:t>
             </a:r>
             <a:r>
               <a:rPr lang="en-US" sz="850" dirty="0" err="1">
@@ -8164,321 +7885,7 @@
                 <a:ea typeface="Calibri" panose="020F0502020204030204" pitchFamily="34" charset="0"/>
                 <a:cs typeface="Courier New" panose="02070309020205020404" pitchFamily="49" charset="0"/>
               </a:rPr>
-              <a:t>rw</a:t>
-            </a:r>
-            <a:r>
-              <a:rPr lang="en-US" sz="850" dirty="0">
-                <a:effectLst/>
-                <a:latin typeface="Courier New" panose="02070309020205020404" pitchFamily="49" charset="0"/>
-                <a:ea typeface="Calibri" panose="020F0502020204030204" pitchFamily="34" charset="0"/>
-                <a:cs typeface="Courier New" panose="02070309020205020404" pitchFamily="49" charset="0"/>
-              </a:rPr>
-              <a:t> global              empty</a:t>
-            </a:r>
-          </a:p>
-          <a:p>
-            <a:pPr marL="0" marR="0">
-              <a:lnSpc>
-                <a:spcPct val="107000"/>
-              </a:lnSpc>
-              <a:spcBef>
-                <a:spcPts val="0"/>
-              </a:spcBef>
-              <a:spcAft>
-                <a:spcPts val="0"/>
-              </a:spcAft>
-            </a:pPr>
-            <a:r>
-              <a:rPr lang="en-US" sz="850" dirty="0">
-                <a:effectLst/>
-                <a:latin typeface="Courier New" panose="02070309020205020404" pitchFamily="49" charset="0"/>
-                <a:ea typeface="Calibri" panose="020F0502020204030204" pitchFamily="34" charset="0"/>
-                <a:cs typeface="Courier New" panose="02070309020205020404" pitchFamily="49" charset="0"/>
-              </a:rPr>
-              <a:t>    |  +--:(contextual)</a:t>
-            </a:r>
-          </a:p>
-          <a:p>
-            <a:pPr marL="0" marR="0">
-              <a:lnSpc>
-                <a:spcPct val="107000"/>
-              </a:lnSpc>
-              <a:spcBef>
-                <a:spcPts val="0"/>
-              </a:spcBef>
-              <a:spcAft>
-                <a:spcPts val="0"/>
-              </a:spcAft>
-            </a:pPr>
-            <a:r>
-              <a:rPr lang="en-US" sz="850" dirty="0">
-                <a:effectLst/>
-                <a:latin typeface="Courier New" panose="02070309020205020404" pitchFamily="49" charset="0"/>
-                <a:ea typeface="Calibri" panose="020F0502020204030204" pitchFamily="34" charset="0"/>
-                <a:cs typeface="Courier New" panose="02070309020205020404" pitchFamily="49" charset="0"/>
-              </a:rPr>
-              <a:t>    |  |  +--</a:t>
-            </a:r>
-            <a:r>
-              <a:rPr lang="en-US" sz="850" dirty="0" err="1">
-                <a:effectLst/>
-                <a:latin typeface="Courier New" panose="02070309020205020404" pitchFamily="49" charset="0"/>
-                <a:ea typeface="Calibri" panose="020F0502020204030204" pitchFamily="34" charset="0"/>
-                <a:cs typeface="Courier New" panose="02070309020205020404" pitchFamily="49" charset="0"/>
-              </a:rPr>
-              <a:t>rw</a:t>
-            </a:r>
-            <a:r>
-              <a:rPr lang="en-US" sz="850" dirty="0">
-                <a:effectLst/>
-                <a:latin typeface="Courier New" panose="02070309020205020404" pitchFamily="49" charset="0"/>
-                <a:ea typeface="Calibri" panose="020F0502020204030204" pitchFamily="34" charset="0"/>
-                <a:cs typeface="Courier New" panose="02070309020205020404" pitchFamily="49" charset="0"/>
-              </a:rPr>
-              <a:t> contextual          empty</a:t>
-            </a:r>
-          </a:p>
-          <a:p>
-            <a:pPr marL="0" marR="0">
-              <a:lnSpc>
-                <a:spcPct val="107000"/>
-              </a:lnSpc>
-              <a:spcBef>
-                <a:spcPts val="0"/>
-              </a:spcBef>
-              <a:spcAft>
-                <a:spcPts val="0"/>
-              </a:spcAft>
-            </a:pPr>
-            <a:r>
-              <a:rPr lang="en-US" sz="850" dirty="0">
-                <a:effectLst/>
-                <a:latin typeface="Courier New" panose="02070309020205020404" pitchFamily="49" charset="0"/>
-                <a:ea typeface="Calibri" panose="020F0502020204030204" pitchFamily="34" charset="0"/>
-                <a:cs typeface="Courier New" panose="02070309020205020404" pitchFamily="49" charset="0"/>
-              </a:rPr>
-              <a:t>    |  +--:(collective)</a:t>
-            </a:r>
-          </a:p>
-          <a:p>
-            <a:pPr marL="0" marR="0">
-              <a:lnSpc>
-                <a:spcPct val="107000"/>
-              </a:lnSpc>
-              <a:spcBef>
-                <a:spcPts val="0"/>
-              </a:spcBef>
-              <a:spcAft>
-                <a:spcPts val="0"/>
-              </a:spcAft>
-            </a:pPr>
-            <a:r>
-              <a:rPr lang="en-US" sz="850" dirty="0">
-                <a:effectLst/>
-                <a:latin typeface="Courier New" panose="02070309020205020404" pitchFamily="49" charset="0"/>
-                <a:ea typeface="Calibri" panose="020F0502020204030204" pitchFamily="34" charset="0"/>
-                <a:cs typeface="Courier New" panose="02070309020205020404" pitchFamily="49" charset="0"/>
-              </a:rPr>
-              <a:t>    |  |  +--</a:t>
-            </a:r>
-            <a:r>
-              <a:rPr lang="en-US" sz="850" dirty="0" err="1">
-                <a:effectLst/>
-                <a:latin typeface="Courier New" panose="02070309020205020404" pitchFamily="49" charset="0"/>
-                <a:ea typeface="Calibri" panose="020F0502020204030204" pitchFamily="34" charset="0"/>
-                <a:cs typeface="Courier New" panose="02070309020205020404" pitchFamily="49" charset="0"/>
-              </a:rPr>
-              <a:t>rw</a:t>
-            </a:r>
-            <a:r>
-              <a:rPr lang="en-US" sz="850" dirty="0">
-                <a:effectLst/>
-                <a:latin typeface="Courier New" panose="02070309020205020404" pitchFamily="49" charset="0"/>
-                <a:ea typeface="Calibri" panose="020F0502020204030204" pitchFamily="34" charset="0"/>
-                <a:cs typeface="Courier New" panose="02070309020205020404" pitchFamily="49" charset="0"/>
-              </a:rPr>
-              <a:t> collective          empty</a:t>
-            </a:r>
-          </a:p>
-          <a:p>
-            <a:pPr marL="0" marR="0">
-              <a:lnSpc>
-                <a:spcPct val="107000"/>
-              </a:lnSpc>
-              <a:spcBef>
-                <a:spcPts val="0"/>
-              </a:spcBef>
-              <a:spcAft>
-                <a:spcPts val="0"/>
-              </a:spcAft>
-            </a:pPr>
-            <a:r>
-              <a:rPr lang="en-US" sz="850" dirty="0">
-                <a:effectLst/>
-                <a:latin typeface="Courier New" panose="02070309020205020404" pitchFamily="49" charset="0"/>
-                <a:ea typeface="Calibri" panose="020F0502020204030204" pitchFamily="34" charset="0"/>
-                <a:cs typeface="Courier New" panose="02070309020205020404" pitchFamily="49" charset="0"/>
-              </a:rPr>
-              <a:t>    |  +--:(none)</a:t>
-            </a:r>
-          </a:p>
-          <a:p>
-            <a:pPr marL="0" marR="0">
-              <a:lnSpc>
-                <a:spcPct val="107000"/>
-              </a:lnSpc>
-              <a:spcBef>
-                <a:spcPts val="0"/>
-              </a:spcBef>
-              <a:spcAft>
-                <a:spcPts val="0"/>
-              </a:spcAft>
-            </a:pPr>
-            <a:r>
-              <a:rPr lang="en-US" sz="850" dirty="0">
-                <a:effectLst/>
-                <a:latin typeface="Courier New" panose="02070309020205020404" pitchFamily="49" charset="0"/>
-                <a:ea typeface="Calibri" panose="020F0502020204030204" pitchFamily="34" charset="0"/>
-                <a:cs typeface="Courier New" panose="02070309020205020404" pitchFamily="49" charset="0"/>
-              </a:rPr>
-              <a:t>    |     +--</a:t>
-            </a:r>
-            <a:r>
-              <a:rPr lang="en-US" sz="850" dirty="0" err="1">
-                <a:effectLst/>
-                <a:latin typeface="Courier New" panose="02070309020205020404" pitchFamily="49" charset="0"/>
-                <a:ea typeface="Calibri" panose="020F0502020204030204" pitchFamily="34" charset="0"/>
-                <a:cs typeface="Courier New" panose="02070309020205020404" pitchFamily="49" charset="0"/>
-              </a:rPr>
-              <a:t>rw</a:t>
-            </a:r>
-            <a:r>
-              <a:rPr lang="en-US" sz="850" dirty="0">
-                <a:effectLst/>
-                <a:latin typeface="Courier New" panose="02070309020205020404" pitchFamily="49" charset="0"/>
-                <a:ea typeface="Calibri" panose="020F0502020204030204" pitchFamily="34" charset="0"/>
-                <a:cs typeface="Courier New" panose="02070309020205020404" pitchFamily="49" charset="0"/>
-              </a:rPr>
-              <a:t> other               empty         </a:t>
-            </a:r>
-          </a:p>
-          <a:p>
-            <a:pPr marL="0" marR="0">
-              <a:lnSpc>
-                <a:spcPct val="107000"/>
-              </a:lnSpc>
-              <a:spcBef>
-                <a:spcPts val="0"/>
-              </a:spcBef>
-              <a:spcAft>
-                <a:spcPts val="0"/>
-              </a:spcAft>
-            </a:pPr>
-            <a:r>
-              <a:rPr lang="en-US" sz="850" dirty="0">
-                <a:latin typeface="Courier New" panose="02070309020205020404" pitchFamily="49" charset="0"/>
-                <a:ea typeface="Calibri" panose="020F0502020204030204" pitchFamily="34" charset="0"/>
-                <a:cs typeface="Courier New" panose="02070309020205020404" pitchFamily="49" charset="0"/>
-              </a:rPr>
-              <a:t>    </a:t>
-            </a:r>
-            <a:r>
-              <a:rPr lang="en-US" sz="850" dirty="0">
-                <a:effectLst/>
-                <a:latin typeface="Courier New" panose="02070309020205020404" pitchFamily="49" charset="0"/>
-                <a:ea typeface="Calibri" panose="020F0502020204030204" pitchFamily="34" charset="0"/>
-                <a:cs typeface="Courier New" panose="02070309020205020404" pitchFamily="49" charset="0"/>
-              </a:rPr>
-              <a:t>+--</a:t>
-            </a:r>
-            <a:r>
-              <a:rPr lang="en-US" sz="850" dirty="0" err="1">
-                <a:effectLst/>
-                <a:latin typeface="Courier New" panose="02070309020205020404" pitchFamily="49" charset="0"/>
-                <a:ea typeface="Calibri" panose="020F0502020204030204" pitchFamily="34" charset="0"/>
-                <a:cs typeface="Courier New" panose="02070309020205020404" pitchFamily="49" charset="0"/>
-              </a:rPr>
-              <a:t>rw</a:t>
-            </a:r>
-            <a:r>
-              <a:rPr lang="en-US" sz="850" dirty="0">
-                <a:effectLst/>
-                <a:latin typeface="Courier New" panose="02070309020205020404" pitchFamily="49" charset="0"/>
-                <a:ea typeface="Calibri" panose="020F0502020204030204" pitchFamily="34" charset="0"/>
-                <a:cs typeface="Courier New" panose="02070309020205020404" pitchFamily="49" charset="0"/>
-              </a:rPr>
-              <a:t> (pattern)?</a:t>
-            </a:r>
-          </a:p>
-          <a:p>
-            <a:pPr marL="0" marR="0">
-              <a:lnSpc>
-                <a:spcPct val="107000"/>
-              </a:lnSpc>
-              <a:spcBef>
-                <a:spcPts val="0"/>
-              </a:spcBef>
-              <a:spcAft>
-                <a:spcPts val="0"/>
-              </a:spcAft>
-            </a:pPr>
-            <a:r>
-              <a:rPr lang="en-US" sz="850" dirty="0">
-                <a:effectLst/>
-                <a:latin typeface="Courier New" panose="02070309020205020404" pitchFamily="49" charset="0"/>
-                <a:ea typeface="Calibri" panose="020F0502020204030204" pitchFamily="34" charset="0"/>
-                <a:cs typeface="Courier New" panose="02070309020205020404" pitchFamily="49" charset="0"/>
-              </a:rPr>
-              <a:t>        +--:(drop)</a:t>
-            </a:r>
-          </a:p>
-          <a:p>
-            <a:pPr marL="0" marR="0">
-              <a:lnSpc>
-                <a:spcPct val="107000"/>
-              </a:lnSpc>
-              <a:spcBef>
-                <a:spcPts val="0"/>
-              </a:spcBef>
-              <a:spcAft>
-                <a:spcPts val="0"/>
-              </a:spcAft>
-            </a:pPr>
-            <a:r>
-              <a:rPr lang="en-US" sz="850" dirty="0">
-                <a:effectLst/>
-                <a:latin typeface="Courier New" panose="02070309020205020404" pitchFamily="49" charset="0"/>
-                <a:ea typeface="Calibri" panose="020F0502020204030204" pitchFamily="34" charset="0"/>
-                <a:cs typeface="Courier New" panose="02070309020205020404" pitchFamily="49" charset="0"/>
-              </a:rPr>
-              <a:t>        |  +--</a:t>
-            </a:r>
-            <a:r>
-              <a:rPr lang="en-US" sz="850" dirty="0" err="1">
-                <a:effectLst/>
-                <a:latin typeface="Courier New" panose="02070309020205020404" pitchFamily="49" charset="0"/>
-                <a:ea typeface="Calibri" panose="020F0502020204030204" pitchFamily="34" charset="0"/>
-                <a:cs typeface="Courier New" panose="02070309020205020404" pitchFamily="49" charset="0"/>
-              </a:rPr>
-              <a:t>rw</a:t>
-            </a:r>
-            <a:r>
-              <a:rPr lang="en-US" sz="850" dirty="0">
-                <a:effectLst/>
-                <a:latin typeface="Courier New" panose="02070309020205020404" pitchFamily="49" charset="0"/>
-                <a:ea typeface="Calibri" panose="020F0502020204030204" pitchFamily="34" charset="0"/>
-                <a:cs typeface="Courier New" panose="02070309020205020404" pitchFamily="49" charset="0"/>
-              </a:rPr>
-              <a:t> </a:t>
-            </a:r>
-            <a:r>
-              <a:rPr lang="en-US" sz="850" dirty="0" err="1">
-                <a:effectLst/>
-                <a:latin typeface="Courier New" panose="02070309020205020404" pitchFamily="49" charset="0"/>
-                <a:ea typeface="Calibri" panose="020F0502020204030204" pitchFamily="34" charset="0"/>
-                <a:cs typeface="Courier New" panose="02070309020205020404" pitchFamily="49" charset="0"/>
-              </a:rPr>
-              <a:t>dropempty</a:t>
+              <a:t>yang:date-and-time</a:t>
             </a:r>
             <a:endParaRPr lang="en-US" sz="850" dirty="0">
               <a:effectLst/>
@@ -8506,21 +7913,17 @@
                 <a:ea typeface="Calibri" panose="020F0502020204030204" pitchFamily="34" charset="0"/>
                 <a:cs typeface="Courier New" panose="02070309020205020404" pitchFamily="49" charset="0"/>
               </a:rPr>
-              <a:t>        +--:(spike)</a:t>
-            </a:r>
-          </a:p>
-          <a:p>
-            <a:pPr marL="0" marR="0">
-              <a:lnSpc>
-                <a:spcPct val="107000"/>
-              </a:lnSpc>
-              <a:spcBef>
-                <a:spcPts val="0"/>
-              </a:spcBef>
-              <a:spcAft>
-                <a:spcPts val="0"/>
-              </a:spcAft>
-            </a:pPr>
+              <a:t>    +--</a:t>
+            </a:r>
+            <a:r>
+              <a:rPr lang="en-US" sz="850" dirty="0" err="1">
+                <a:effectLst/>
+                <a:latin typeface="Courier New" panose="02070309020205020404" pitchFamily="49" charset="0"/>
+                <a:ea typeface="Calibri" panose="020F0502020204030204" pitchFamily="34" charset="0"/>
+                <a:cs typeface="Courier New" panose="02070309020205020404" pitchFamily="49" charset="0"/>
+              </a:rPr>
+              <a:t>rw</a:t>
+            </a:r>
             <a:r>
               <a:rPr lang="en-US" sz="850" dirty="0">
                 <a:effectLst/>
@@ -8528,7 +7931,29 @@
                 <a:ea typeface="Calibri" panose="020F0502020204030204" pitchFamily="34" charset="0"/>
                 <a:cs typeface="Courier New" panose="02070309020205020404" pitchFamily="49" charset="0"/>
               </a:rPr>
-              <a:t>        |  +--</a:t>
+              <a:t> confidence-score           float</a:t>
+            </a:r>
+          </a:p>
+          <a:p>
+            <a:pPr marL="0" marR="0">
+              <a:lnSpc>
+                <a:spcPct val="107000"/>
+              </a:lnSpc>
+              <a:spcBef>
+                <a:spcPts val="0"/>
+              </a:spcBef>
+              <a:spcAft>
+                <a:spcPts val="0"/>
+              </a:spcAft>
+            </a:pPr>
+            <a:r>
+              <a:rPr lang="en-US" sz="850" dirty="0">
+                <a:effectLst/>
+                <a:latin typeface="Courier New" panose="02070309020205020404" pitchFamily="49" charset="0"/>
+                <a:ea typeface="Calibri" panose="020F0502020204030204" pitchFamily="34" charset="0"/>
+                <a:cs typeface="Courier New" panose="02070309020205020404" pitchFamily="49" charset="0"/>
+              </a:rPr>
+              <a:t>    +--</a:t>
             </a:r>
             <a:r>
               <a:rPr lang="en-US" sz="850" dirty="0" err="1">
@@ -8546,7 +7971,7 @@
                 <a:ea typeface="Calibri" panose="020F0502020204030204" pitchFamily="34" charset="0"/>
                 <a:cs typeface="Courier New" panose="02070309020205020404" pitchFamily="49" charset="0"/>
               </a:rPr>
-              <a:t> spike                empty</a:t>
+              <a:t> concern-score?             float</a:t>
             </a:r>
           </a:p>
           <a:p>
@@ -8568,21 +7993,17 @@
                 <a:ea typeface="Calibri" panose="020F0502020204030204" pitchFamily="34" charset="0"/>
                 <a:cs typeface="Courier New" panose="02070309020205020404" pitchFamily="49" charset="0"/>
               </a:rPr>
-              <a:t>        +--:(mean-shift)</a:t>
-            </a:r>
-          </a:p>
-          <a:p>
-            <a:pPr marL="0" marR="0">
-              <a:lnSpc>
-                <a:spcPct val="107000"/>
-              </a:lnSpc>
-              <a:spcBef>
-                <a:spcPts val="0"/>
-              </a:spcBef>
-              <a:spcAft>
-                <a:spcPts val="0"/>
-              </a:spcAft>
-            </a:pPr>
+              <a:t>    +--</a:t>
+            </a:r>
+            <a:r>
+              <a:rPr lang="en-US" sz="850" dirty="0" err="1">
+                <a:effectLst/>
+                <a:latin typeface="Courier New" panose="02070309020205020404" pitchFamily="49" charset="0"/>
+                <a:ea typeface="Calibri" panose="020F0502020204030204" pitchFamily="34" charset="0"/>
+                <a:cs typeface="Courier New" panose="02070309020205020404" pitchFamily="49" charset="0"/>
+              </a:rPr>
+              <a:t>rw</a:t>
+            </a:r>
             <a:r>
               <a:rPr lang="en-US" sz="850" dirty="0">
                 <a:effectLst/>
@@ -8590,7 +8011,29 @@
                 <a:ea typeface="Calibri" panose="020F0502020204030204" pitchFamily="34" charset="0"/>
                 <a:cs typeface="Courier New" panose="02070309020205020404" pitchFamily="49" charset="0"/>
               </a:rPr>
-              <a:t>        |  +--</a:t>
+              <a:t> tags* [key]</a:t>
+            </a:r>
+          </a:p>
+          <a:p>
+            <a:pPr marL="0" marR="0">
+              <a:lnSpc>
+                <a:spcPct val="107000"/>
+              </a:lnSpc>
+              <a:spcBef>
+                <a:spcPts val="0"/>
+              </a:spcBef>
+              <a:spcAft>
+                <a:spcPts val="0"/>
+              </a:spcAft>
+            </a:pPr>
+            <a:r>
+              <a:rPr lang="en-US" sz="850" dirty="0">
+                <a:effectLst/>
+                <a:latin typeface="Courier New" panose="02070309020205020404" pitchFamily="49" charset="0"/>
+                <a:ea typeface="Calibri" panose="020F0502020204030204" pitchFamily="34" charset="0"/>
+                <a:cs typeface="Courier New" panose="02070309020205020404" pitchFamily="49" charset="0"/>
+              </a:rPr>
+              <a:t>    |  +--</a:t>
             </a:r>
             <a:r>
               <a:rPr lang="en-US" sz="850" dirty="0" err="1">
@@ -8608,7 +8051,7 @@
                 <a:ea typeface="Calibri" panose="020F0502020204030204" pitchFamily="34" charset="0"/>
                 <a:cs typeface="Courier New" panose="02070309020205020404" pitchFamily="49" charset="0"/>
               </a:rPr>
-              <a:t> mean-shift           empty</a:t>
+              <a:t> key      string</a:t>
             </a:r>
           </a:p>
           <a:p>
@@ -8630,21 +8073,17 @@
                 <a:ea typeface="Calibri" panose="020F0502020204030204" pitchFamily="34" charset="0"/>
                 <a:cs typeface="Courier New" panose="02070309020205020404" pitchFamily="49" charset="0"/>
               </a:rPr>
-              <a:t>        +--:(seasonality-shift)</a:t>
-            </a:r>
-          </a:p>
-          <a:p>
-            <a:pPr marL="0" marR="0">
-              <a:lnSpc>
-                <a:spcPct val="107000"/>
-              </a:lnSpc>
-              <a:spcBef>
-                <a:spcPts val="0"/>
-              </a:spcBef>
-              <a:spcAft>
-                <a:spcPts val="0"/>
-              </a:spcAft>
-            </a:pPr>
+              <a:t>    |  +--</a:t>
+            </a:r>
+            <a:r>
+              <a:rPr lang="en-US" sz="850" dirty="0" err="1">
+                <a:effectLst/>
+                <a:latin typeface="Courier New" panose="02070309020205020404" pitchFamily="49" charset="0"/>
+                <a:ea typeface="Calibri" panose="020F0502020204030204" pitchFamily="34" charset="0"/>
+                <a:cs typeface="Courier New" panose="02070309020205020404" pitchFamily="49" charset="0"/>
+              </a:rPr>
+              <a:t>rw</a:t>
+            </a:r>
             <a:r>
               <a:rPr lang="en-US" sz="850" dirty="0">
                 <a:effectLst/>
@@ -8652,7 +8091,29 @@
                 <a:ea typeface="Calibri" panose="020F0502020204030204" pitchFamily="34" charset="0"/>
                 <a:cs typeface="Courier New" panose="02070309020205020404" pitchFamily="49" charset="0"/>
               </a:rPr>
-              <a:t>        |  +--</a:t>
+              <a:t> value    string</a:t>
+            </a:r>
+          </a:p>
+          <a:p>
+            <a:pPr marL="0" marR="0">
+              <a:lnSpc>
+                <a:spcPct val="107000"/>
+              </a:lnSpc>
+              <a:spcBef>
+                <a:spcPts val="0"/>
+              </a:spcBef>
+              <a:spcAft>
+                <a:spcPts val="0"/>
+              </a:spcAft>
+            </a:pPr>
+            <a:r>
+              <a:rPr lang="en-US" sz="850" dirty="0">
+                <a:effectLst/>
+                <a:latin typeface="Courier New" panose="02070309020205020404" pitchFamily="49" charset="0"/>
+                <a:ea typeface="Calibri" panose="020F0502020204030204" pitchFamily="34" charset="0"/>
+                <a:cs typeface="Courier New" panose="02070309020205020404" pitchFamily="49" charset="0"/>
+              </a:rPr>
+              <a:t>    +--</a:t>
             </a:r>
             <a:r>
               <a:rPr lang="en-US" sz="850" dirty="0" err="1">
@@ -8670,7 +8131,7 @@
                 <a:ea typeface="Calibri" panose="020F0502020204030204" pitchFamily="34" charset="0"/>
                 <a:cs typeface="Courier New" panose="02070309020205020404" pitchFamily="49" charset="0"/>
               </a:rPr>
-              <a:t> seasonality-shift    empty</a:t>
+              <a:t> (pattern)?</a:t>
             </a:r>
           </a:p>
           <a:p>
@@ -8692,7 +8153,7 @@
                 <a:ea typeface="Calibri" panose="020F0502020204030204" pitchFamily="34" charset="0"/>
                 <a:cs typeface="Courier New" panose="02070309020205020404" pitchFamily="49" charset="0"/>
               </a:rPr>
-              <a:t>        +--:(trend)</a:t>
+              <a:t>    |  +--:(drop)</a:t>
             </a:r>
           </a:p>
           <a:p>
@@ -8714,7 +8175,7 @@
                 <a:ea typeface="Calibri" panose="020F0502020204030204" pitchFamily="34" charset="0"/>
                 <a:cs typeface="Courier New" panose="02070309020205020404" pitchFamily="49" charset="0"/>
               </a:rPr>
-              <a:t>        |  +--</a:t>
+              <a:t>    |  |  +--</a:t>
             </a:r>
             <a:r>
               <a:rPr lang="en-US" sz="850" dirty="0" err="1">
@@ -8732,8 +8193,23 @@
                 <a:ea typeface="Calibri" panose="020F0502020204030204" pitchFamily="34" charset="0"/>
                 <a:cs typeface="Courier New" panose="02070309020205020404" pitchFamily="49" charset="0"/>
               </a:rPr>
-              <a:t> trend                empty</a:t>
-            </a:r>
+              <a:t> </a:t>
+            </a:r>
+            <a:r>
+              <a:rPr lang="en-US" sz="850" dirty="0" err="1">
+                <a:effectLst/>
+                <a:latin typeface="Courier New" panose="02070309020205020404" pitchFamily="49" charset="0"/>
+                <a:ea typeface="Calibri" panose="020F0502020204030204" pitchFamily="34" charset="0"/>
+                <a:cs typeface="Courier New" panose="02070309020205020404" pitchFamily="49" charset="0"/>
+              </a:rPr>
+              <a:t>dropempty</a:t>
+            </a:r>
+            <a:endParaRPr lang="en-US" sz="850" dirty="0">
+              <a:effectLst/>
+              <a:latin typeface="Courier New" panose="02070309020205020404" pitchFamily="49" charset="0"/>
+              <a:ea typeface="Calibri" panose="020F0502020204030204" pitchFamily="34" charset="0"/>
+              <a:cs typeface="Courier New" panose="02070309020205020404" pitchFamily="49" charset="0"/>
+            </a:endParaRPr>
           </a:p>
           <a:p>
             <a:pPr marL="0" marR="0">
@@ -8754,7 +8230,7 @@
                 <a:ea typeface="Calibri" panose="020F0502020204030204" pitchFamily="34" charset="0"/>
                 <a:cs typeface="Courier New" panose="02070309020205020404" pitchFamily="49" charset="0"/>
               </a:rPr>
-              <a:t>        +--:(other)</a:t>
+              <a:t>    |  +--:(spike)</a:t>
             </a:r>
           </a:p>
           <a:p>
@@ -8776,7 +8252,7 @@
                 <a:ea typeface="Calibri" panose="020F0502020204030204" pitchFamily="34" charset="0"/>
                 <a:cs typeface="Courier New" panose="02070309020205020404" pitchFamily="49" charset="0"/>
               </a:rPr>
-              <a:t>          +--</a:t>
+              <a:t>    |  |  +--</a:t>
             </a:r>
             <a:r>
               <a:rPr lang="en-US" sz="850" dirty="0" err="1">
@@ -8794,7 +8270,499 @@
                 <a:ea typeface="Calibri" panose="020F0502020204030204" pitchFamily="34" charset="0"/>
                 <a:cs typeface="Courier New" panose="02070309020205020404" pitchFamily="49" charset="0"/>
               </a:rPr>
+              <a:t> spike                empty</a:t>
+            </a:r>
+          </a:p>
+          <a:p>
+            <a:pPr marL="0" marR="0">
+              <a:lnSpc>
+                <a:spcPct val="107000"/>
+              </a:lnSpc>
+              <a:spcBef>
+                <a:spcPts val="0"/>
+              </a:spcBef>
+              <a:spcAft>
+                <a:spcPts val="0"/>
+              </a:spcAft>
+            </a:pPr>
+            <a:r>
+              <a:rPr lang="en-US" sz="850" dirty="0">
+                <a:effectLst/>
+                <a:latin typeface="Courier New" panose="02070309020205020404" pitchFamily="49" charset="0"/>
+                <a:ea typeface="Calibri" panose="020F0502020204030204" pitchFamily="34" charset="0"/>
+                <a:cs typeface="Courier New" panose="02070309020205020404" pitchFamily="49" charset="0"/>
+              </a:rPr>
+              <a:t>    |  +--:(mean-shift)</a:t>
+            </a:r>
+          </a:p>
+          <a:p>
+            <a:pPr marL="0" marR="0">
+              <a:lnSpc>
+                <a:spcPct val="107000"/>
+              </a:lnSpc>
+              <a:spcBef>
+                <a:spcPts val="0"/>
+              </a:spcBef>
+              <a:spcAft>
+                <a:spcPts val="0"/>
+              </a:spcAft>
+            </a:pPr>
+            <a:r>
+              <a:rPr lang="en-US" sz="850" dirty="0">
+                <a:effectLst/>
+                <a:latin typeface="Courier New" panose="02070309020205020404" pitchFamily="49" charset="0"/>
+                <a:ea typeface="Calibri" panose="020F0502020204030204" pitchFamily="34" charset="0"/>
+                <a:cs typeface="Courier New" panose="02070309020205020404" pitchFamily="49" charset="0"/>
+              </a:rPr>
+              <a:t>    |  |  +--</a:t>
+            </a:r>
+            <a:r>
+              <a:rPr lang="en-US" sz="850" dirty="0" err="1">
+                <a:effectLst/>
+                <a:latin typeface="Courier New" panose="02070309020205020404" pitchFamily="49" charset="0"/>
+                <a:ea typeface="Calibri" panose="020F0502020204030204" pitchFamily="34" charset="0"/>
+                <a:cs typeface="Courier New" panose="02070309020205020404" pitchFamily="49" charset="0"/>
+              </a:rPr>
+              <a:t>rw</a:t>
+            </a:r>
+            <a:r>
+              <a:rPr lang="en-US" sz="850" dirty="0">
+                <a:effectLst/>
+                <a:latin typeface="Courier New" panose="02070309020205020404" pitchFamily="49" charset="0"/>
+                <a:ea typeface="Calibri" panose="020F0502020204030204" pitchFamily="34" charset="0"/>
+                <a:cs typeface="Courier New" panose="02070309020205020404" pitchFamily="49" charset="0"/>
+              </a:rPr>
+              <a:t> mean-shift           empty</a:t>
+            </a:r>
+          </a:p>
+          <a:p>
+            <a:pPr marL="0" marR="0">
+              <a:lnSpc>
+                <a:spcPct val="107000"/>
+              </a:lnSpc>
+              <a:spcBef>
+                <a:spcPts val="0"/>
+              </a:spcBef>
+              <a:spcAft>
+                <a:spcPts val="0"/>
+              </a:spcAft>
+            </a:pPr>
+            <a:r>
+              <a:rPr lang="en-US" sz="850" dirty="0">
+                <a:effectLst/>
+                <a:latin typeface="Courier New" panose="02070309020205020404" pitchFamily="49" charset="0"/>
+                <a:ea typeface="Calibri" panose="020F0502020204030204" pitchFamily="34" charset="0"/>
+                <a:cs typeface="Courier New" panose="02070309020205020404" pitchFamily="49" charset="0"/>
+              </a:rPr>
+              <a:t>    |  +--:(seasonality-shift)</a:t>
+            </a:r>
+          </a:p>
+          <a:p>
+            <a:pPr marL="0" marR="0">
+              <a:lnSpc>
+                <a:spcPct val="107000"/>
+              </a:lnSpc>
+              <a:spcBef>
+                <a:spcPts val="0"/>
+              </a:spcBef>
+              <a:spcAft>
+                <a:spcPts val="0"/>
+              </a:spcAft>
+            </a:pPr>
+            <a:r>
+              <a:rPr lang="en-US" sz="850" dirty="0">
+                <a:effectLst/>
+                <a:latin typeface="Courier New" panose="02070309020205020404" pitchFamily="49" charset="0"/>
+                <a:ea typeface="Calibri" panose="020F0502020204030204" pitchFamily="34" charset="0"/>
+                <a:cs typeface="Courier New" panose="02070309020205020404" pitchFamily="49" charset="0"/>
+              </a:rPr>
+              <a:t>    |  |  +--</a:t>
+            </a:r>
+            <a:r>
+              <a:rPr lang="en-US" sz="850" dirty="0" err="1">
+                <a:effectLst/>
+                <a:latin typeface="Courier New" panose="02070309020205020404" pitchFamily="49" charset="0"/>
+                <a:ea typeface="Calibri" panose="020F0502020204030204" pitchFamily="34" charset="0"/>
+                <a:cs typeface="Courier New" panose="02070309020205020404" pitchFamily="49" charset="0"/>
+              </a:rPr>
+              <a:t>rw</a:t>
+            </a:r>
+            <a:r>
+              <a:rPr lang="en-US" sz="850" dirty="0">
+                <a:effectLst/>
+                <a:latin typeface="Courier New" panose="02070309020205020404" pitchFamily="49" charset="0"/>
+                <a:ea typeface="Calibri" panose="020F0502020204030204" pitchFamily="34" charset="0"/>
+                <a:cs typeface="Courier New" panose="02070309020205020404" pitchFamily="49" charset="0"/>
+              </a:rPr>
+              <a:t> seasonality-shift    empty</a:t>
+            </a:r>
+          </a:p>
+          <a:p>
+            <a:pPr marL="0" marR="0">
+              <a:lnSpc>
+                <a:spcPct val="107000"/>
+              </a:lnSpc>
+              <a:spcBef>
+                <a:spcPts val="0"/>
+              </a:spcBef>
+              <a:spcAft>
+                <a:spcPts val="0"/>
+              </a:spcAft>
+            </a:pPr>
+            <a:r>
+              <a:rPr lang="en-US" sz="850" dirty="0">
+                <a:effectLst/>
+                <a:latin typeface="Courier New" panose="02070309020205020404" pitchFamily="49" charset="0"/>
+                <a:ea typeface="Calibri" panose="020F0502020204030204" pitchFamily="34" charset="0"/>
+                <a:cs typeface="Courier New" panose="02070309020205020404" pitchFamily="49" charset="0"/>
+              </a:rPr>
+              <a:t>    |  +--:(trend)</a:t>
+            </a:r>
+          </a:p>
+          <a:p>
+            <a:pPr marL="0" marR="0">
+              <a:lnSpc>
+                <a:spcPct val="107000"/>
+              </a:lnSpc>
+              <a:spcBef>
+                <a:spcPts val="0"/>
+              </a:spcBef>
+              <a:spcAft>
+                <a:spcPts val="0"/>
+              </a:spcAft>
+            </a:pPr>
+            <a:r>
+              <a:rPr lang="en-US" sz="850" dirty="0">
+                <a:effectLst/>
+                <a:latin typeface="Courier New" panose="02070309020205020404" pitchFamily="49" charset="0"/>
+                <a:ea typeface="Calibri" panose="020F0502020204030204" pitchFamily="34" charset="0"/>
+                <a:cs typeface="Courier New" panose="02070309020205020404" pitchFamily="49" charset="0"/>
+              </a:rPr>
+              <a:t>    |  |  +--</a:t>
+            </a:r>
+            <a:r>
+              <a:rPr lang="en-US" sz="850" dirty="0" err="1">
+                <a:effectLst/>
+                <a:latin typeface="Courier New" panose="02070309020205020404" pitchFamily="49" charset="0"/>
+                <a:ea typeface="Calibri" panose="020F0502020204030204" pitchFamily="34" charset="0"/>
+                <a:cs typeface="Courier New" panose="02070309020205020404" pitchFamily="49" charset="0"/>
+              </a:rPr>
+              <a:t>rw</a:t>
+            </a:r>
+            <a:r>
+              <a:rPr lang="en-US" sz="850" dirty="0">
+                <a:effectLst/>
+                <a:latin typeface="Courier New" panose="02070309020205020404" pitchFamily="49" charset="0"/>
+                <a:ea typeface="Calibri" panose="020F0502020204030204" pitchFamily="34" charset="0"/>
+                <a:cs typeface="Courier New" panose="02070309020205020404" pitchFamily="49" charset="0"/>
+              </a:rPr>
+              <a:t> trend                empty</a:t>
+            </a:r>
+          </a:p>
+          <a:p>
+            <a:pPr marL="0" marR="0">
+              <a:lnSpc>
+                <a:spcPct val="107000"/>
+              </a:lnSpc>
+              <a:spcBef>
+                <a:spcPts val="0"/>
+              </a:spcBef>
+              <a:spcAft>
+                <a:spcPts val="0"/>
+              </a:spcAft>
+            </a:pPr>
+            <a:r>
+              <a:rPr lang="en-US" sz="850" dirty="0">
+                <a:effectLst/>
+                <a:latin typeface="Courier New" panose="02070309020205020404" pitchFamily="49" charset="0"/>
+                <a:ea typeface="Calibri" panose="020F0502020204030204" pitchFamily="34" charset="0"/>
+                <a:cs typeface="Courier New" panose="02070309020205020404" pitchFamily="49" charset="0"/>
+              </a:rPr>
+              <a:t>    |  +--:(other)</a:t>
+            </a:r>
+          </a:p>
+          <a:p>
+            <a:pPr marL="0" marR="0">
+              <a:lnSpc>
+                <a:spcPct val="107000"/>
+              </a:lnSpc>
+              <a:spcBef>
+                <a:spcPts val="0"/>
+              </a:spcBef>
+              <a:spcAft>
+                <a:spcPts val="0"/>
+              </a:spcAft>
+            </a:pPr>
+            <a:r>
+              <a:rPr lang="en-US" sz="850" dirty="0">
+                <a:effectLst/>
+                <a:latin typeface="Courier New" panose="02070309020205020404" pitchFamily="49" charset="0"/>
+                <a:ea typeface="Calibri" panose="020F0502020204030204" pitchFamily="34" charset="0"/>
+                <a:cs typeface="Courier New" panose="02070309020205020404" pitchFamily="49" charset="0"/>
+              </a:rPr>
+              <a:t>    |     +--</a:t>
+            </a:r>
+            <a:r>
+              <a:rPr lang="en-US" sz="850" dirty="0" err="1">
+                <a:effectLst/>
+                <a:latin typeface="Courier New" panose="02070309020205020404" pitchFamily="49" charset="0"/>
+                <a:ea typeface="Calibri" panose="020F0502020204030204" pitchFamily="34" charset="0"/>
+                <a:cs typeface="Courier New" panose="02070309020205020404" pitchFamily="49" charset="0"/>
+              </a:rPr>
+              <a:t>rw</a:t>
+            </a:r>
+            <a:r>
+              <a:rPr lang="en-US" sz="850" dirty="0">
+                <a:effectLst/>
+                <a:latin typeface="Courier New" panose="02070309020205020404" pitchFamily="49" charset="0"/>
+                <a:ea typeface="Calibri" panose="020F0502020204030204" pitchFamily="34" charset="0"/>
+                <a:cs typeface="Courier New" panose="02070309020205020404" pitchFamily="49" charset="0"/>
+              </a:rPr>
               <a:t> other                string</a:t>
+            </a:r>
+          </a:p>
+          <a:p>
+            <a:pPr marL="0" marR="0">
+              <a:lnSpc>
+                <a:spcPct val="107000"/>
+              </a:lnSpc>
+              <a:spcBef>
+                <a:spcPts val="0"/>
+              </a:spcBef>
+              <a:spcAft>
+                <a:spcPts val="0"/>
+              </a:spcAft>
+            </a:pPr>
+            <a:r>
+              <a:rPr lang="en-US" sz="850" dirty="0">
+                <a:effectLst/>
+                <a:latin typeface="Courier New" panose="02070309020205020404" pitchFamily="49" charset="0"/>
+                <a:ea typeface="Calibri" panose="020F0502020204030204" pitchFamily="34" charset="0"/>
+                <a:cs typeface="Courier New" panose="02070309020205020404" pitchFamily="49" charset="0"/>
+              </a:rPr>
+              <a:t>    +--</a:t>
+            </a:r>
+            <a:r>
+              <a:rPr lang="en-US" sz="850" dirty="0" err="1">
+                <a:effectLst/>
+                <a:latin typeface="Courier New" panose="02070309020205020404" pitchFamily="49" charset="0"/>
+                <a:ea typeface="Calibri" panose="020F0502020204030204" pitchFamily="34" charset="0"/>
+                <a:cs typeface="Courier New" panose="02070309020205020404" pitchFamily="49" charset="0"/>
+              </a:rPr>
+              <a:t>rw</a:t>
+            </a:r>
+            <a:r>
+              <a:rPr lang="en-US" sz="850" dirty="0">
+                <a:effectLst/>
+                <a:latin typeface="Courier New" panose="02070309020205020404" pitchFamily="49" charset="0"/>
+                <a:ea typeface="Calibri" panose="020F0502020204030204" pitchFamily="34" charset="0"/>
+                <a:cs typeface="Courier New" panose="02070309020205020404" pitchFamily="49" charset="0"/>
+              </a:rPr>
+              <a:t> source</a:t>
+            </a:r>
+          </a:p>
+          <a:p>
+            <a:pPr marL="0" marR="0">
+              <a:lnSpc>
+                <a:spcPct val="107000"/>
+              </a:lnSpc>
+              <a:spcBef>
+                <a:spcPts val="0"/>
+              </a:spcBef>
+              <a:spcAft>
+                <a:spcPts val="0"/>
+              </a:spcAft>
+            </a:pPr>
+            <a:r>
+              <a:rPr lang="en-US" sz="850" dirty="0">
+                <a:effectLst/>
+                <a:latin typeface="Courier New" panose="02070309020205020404" pitchFamily="49" charset="0"/>
+                <a:ea typeface="Calibri" panose="020F0502020204030204" pitchFamily="34" charset="0"/>
+                <a:cs typeface="Courier New" panose="02070309020205020404" pitchFamily="49" charset="0"/>
+              </a:rPr>
+              <a:t>        +--</a:t>
+            </a:r>
+            <a:r>
+              <a:rPr lang="en-US" sz="850" dirty="0" err="1">
+                <a:effectLst/>
+                <a:latin typeface="Courier New" panose="02070309020205020404" pitchFamily="49" charset="0"/>
+                <a:ea typeface="Calibri" panose="020F0502020204030204" pitchFamily="34" charset="0"/>
+                <a:cs typeface="Courier New" panose="02070309020205020404" pitchFamily="49" charset="0"/>
+              </a:rPr>
+              <a:t>rw</a:t>
+            </a:r>
+            <a:r>
+              <a:rPr lang="en-US" sz="850" dirty="0">
+                <a:effectLst/>
+                <a:latin typeface="Courier New" panose="02070309020205020404" pitchFamily="49" charset="0"/>
+                <a:ea typeface="Calibri" panose="020F0502020204030204" pitchFamily="34" charset="0"/>
+                <a:cs typeface="Courier New" panose="02070309020205020404" pitchFamily="49" charset="0"/>
+              </a:rPr>
+              <a:t> (source-type)</a:t>
+            </a:r>
+          </a:p>
+          <a:p>
+            <a:pPr marL="0" marR="0">
+              <a:lnSpc>
+                <a:spcPct val="107000"/>
+              </a:lnSpc>
+              <a:spcBef>
+                <a:spcPts val="0"/>
+              </a:spcBef>
+              <a:spcAft>
+                <a:spcPts val="0"/>
+              </a:spcAft>
+            </a:pPr>
+            <a:r>
+              <a:rPr lang="en-US" sz="850" dirty="0">
+                <a:effectLst/>
+                <a:latin typeface="Courier New" panose="02070309020205020404" pitchFamily="49" charset="0"/>
+                <a:ea typeface="Calibri" panose="020F0502020204030204" pitchFamily="34" charset="0"/>
+                <a:cs typeface="Courier New" panose="02070309020205020404" pitchFamily="49" charset="0"/>
+              </a:rPr>
+              <a:t>        |  +--:(human)</a:t>
+            </a:r>
+          </a:p>
+          <a:p>
+            <a:pPr marL="0" marR="0">
+              <a:lnSpc>
+                <a:spcPct val="107000"/>
+              </a:lnSpc>
+              <a:spcBef>
+                <a:spcPts val="0"/>
+              </a:spcBef>
+              <a:spcAft>
+                <a:spcPts val="0"/>
+              </a:spcAft>
+            </a:pPr>
+            <a:r>
+              <a:rPr lang="en-US" sz="850" dirty="0">
+                <a:effectLst/>
+                <a:latin typeface="Courier New" panose="02070309020205020404" pitchFamily="49" charset="0"/>
+                <a:ea typeface="Calibri" panose="020F0502020204030204" pitchFamily="34" charset="0"/>
+                <a:cs typeface="Courier New" panose="02070309020205020404" pitchFamily="49" charset="0"/>
+              </a:rPr>
+              <a:t>        |  |  +--</a:t>
+            </a:r>
+            <a:r>
+              <a:rPr lang="en-US" sz="850" dirty="0" err="1">
+                <a:effectLst/>
+                <a:latin typeface="Courier New" panose="02070309020205020404" pitchFamily="49" charset="0"/>
+                <a:ea typeface="Calibri" panose="020F0502020204030204" pitchFamily="34" charset="0"/>
+                <a:cs typeface="Courier New" panose="02070309020205020404" pitchFamily="49" charset="0"/>
+              </a:rPr>
+              <a:t>rw</a:t>
+            </a:r>
+            <a:r>
+              <a:rPr lang="en-US" sz="850" dirty="0">
+                <a:effectLst/>
+                <a:latin typeface="Courier New" panose="02070309020205020404" pitchFamily="49" charset="0"/>
+                <a:ea typeface="Calibri" panose="020F0502020204030204" pitchFamily="34" charset="0"/>
+                <a:cs typeface="Courier New" panose="02070309020205020404" pitchFamily="49" charset="0"/>
+              </a:rPr>
+              <a:t> human        empty</a:t>
+            </a:r>
+          </a:p>
+          <a:p>
+            <a:pPr marL="0" marR="0">
+              <a:lnSpc>
+                <a:spcPct val="107000"/>
+              </a:lnSpc>
+              <a:spcBef>
+                <a:spcPts val="0"/>
+              </a:spcBef>
+              <a:spcAft>
+                <a:spcPts val="0"/>
+              </a:spcAft>
+            </a:pPr>
+            <a:r>
+              <a:rPr lang="en-US" sz="850" dirty="0">
+                <a:effectLst/>
+                <a:latin typeface="Courier New" panose="02070309020205020404" pitchFamily="49" charset="0"/>
+                <a:ea typeface="Calibri" panose="020F0502020204030204" pitchFamily="34" charset="0"/>
+                <a:cs typeface="Courier New" panose="02070309020205020404" pitchFamily="49" charset="0"/>
+              </a:rPr>
+              <a:t>        |  +--:(algorithm)</a:t>
+            </a:r>
+          </a:p>
+          <a:p>
+            <a:pPr marL="0" marR="0">
+              <a:lnSpc>
+                <a:spcPct val="107000"/>
+              </a:lnSpc>
+              <a:spcBef>
+                <a:spcPts val="0"/>
+              </a:spcBef>
+              <a:spcAft>
+                <a:spcPts val="0"/>
+              </a:spcAft>
+            </a:pPr>
+            <a:r>
+              <a:rPr lang="en-US" sz="850" dirty="0">
+                <a:effectLst/>
+                <a:latin typeface="Courier New" panose="02070309020205020404" pitchFamily="49" charset="0"/>
+                <a:ea typeface="Calibri" panose="020F0502020204030204" pitchFamily="34" charset="0"/>
+                <a:cs typeface="Courier New" panose="02070309020205020404" pitchFamily="49" charset="0"/>
+              </a:rPr>
+              <a:t>        |     +--</a:t>
+            </a:r>
+            <a:r>
+              <a:rPr lang="en-US" sz="850" dirty="0" err="1">
+                <a:effectLst/>
+                <a:latin typeface="Courier New" panose="02070309020205020404" pitchFamily="49" charset="0"/>
+                <a:ea typeface="Calibri" panose="020F0502020204030204" pitchFamily="34" charset="0"/>
+                <a:cs typeface="Courier New" panose="02070309020205020404" pitchFamily="49" charset="0"/>
+              </a:rPr>
+              <a:t>rw</a:t>
+            </a:r>
+            <a:r>
+              <a:rPr lang="en-US" sz="850" dirty="0">
+                <a:effectLst/>
+                <a:latin typeface="Courier New" panose="02070309020205020404" pitchFamily="49" charset="0"/>
+                <a:ea typeface="Calibri" panose="020F0502020204030204" pitchFamily="34" charset="0"/>
+                <a:cs typeface="Courier New" panose="02070309020205020404" pitchFamily="49" charset="0"/>
+              </a:rPr>
+              <a:t> algorithm    empty</a:t>
+            </a:r>
+          </a:p>
+          <a:p>
+            <a:pPr marL="0" marR="0">
+              <a:lnSpc>
+                <a:spcPct val="107000"/>
+              </a:lnSpc>
+              <a:spcBef>
+                <a:spcPts val="0"/>
+              </a:spcBef>
+              <a:spcAft>
+                <a:spcPts val="0"/>
+              </a:spcAft>
+            </a:pPr>
+            <a:r>
+              <a:rPr lang="en-US" sz="850" dirty="0">
+                <a:effectLst/>
+                <a:latin typeface="Courier New" panose="02070309020205020404" pitchFamily="49" charset="0"/>
+                <a:ea typeface="Calibri" panose="020F0502020204030204" pitchFamily="34" charset="0"/>
+                <a:cs typeface="Courier New" panose="02070309020205020404" pitchFamily="49" charset="0"/>
+              </a:rPr>
+              <a:t>        +--</a:t>
+            </a:r>
+            <a:r>
+              <a:rPr lang="en-US" sz="850" dirty="0" err="1">
+                <a:effectLst/>
+                <a:latin typeface="Courier New" panose="02070309020205020404" pitchFamily="49" charset="0"/>
+                <a:ea typeface="Calibri" panose="020F0502020204030204" pitchFamily="34" charset="0"/>
+                <a:cs typeface="Courier New" panose="02070309020205020404" pitchFamily="49" charset="0"/>
+              </a:rPr>
+              <a:t>rw</a:t>
+            </a:r>
+            <a:r>
+              <a:rPr lang="en-US" sz="850" dirty="0">
+                <a:effectLst/>
+                <a:latin typeface="Courier New" panose="02070309020205020404" pitchFamily="49" charset="0"/>
+                <a:ea typeface="Calibri" panose="020F0502020204030204" pitchFamily="34" charset="0"/>
+                <a:cs typeface="Courier New" panose="02070309020205020404" pitchFamily="49" charset="0"/>
+              </a:rPr>
+              <a:t> name?              string</a:t>
             </a:r>
             <a:endParaRPr lang="de-CH" sz="850" dirty="0">
               <a:latin typeface="Courier New" panose="02070309020205020404" pitchFamily="49" charset="0"/>
@@ -8848,7 +8816,7 @@
         <p:spPr>
           <a:xfrm>
             <a:off x="838200" y="1690688"/>
-            <a:ext cx="4373880" cy="4009367"/>
+            <a:ext cx="4373880" cy="2889574"/>
           </a:xfrm>
           <a:prstGeom prst="rect">
             <a:avLst/>
@@ -8919,7 +8887,7 @@
                 <a:ea typeface="Calibri" panose="020F0502020204030204" pitchFamily="34" charset="0"/>
                 <a:cs typeface="Courier New" panose="02070309020205020404" pitchFamily="49" charset="0"/>
               </a:rPr>
-              <a:t>  +--</a:t>
+              <a:t> +--</a:t>
             </a:r>
             <a:r>
               <a:rPr lang="en-US" sz="850" dirty="0" err="1">
@@ -8959,7 +8927,7 @@
                 <a:ea typeface="Calibri" panose="020F0502020204030204" pitchFamily="34" charset="0"/>
                 <a:cs typeface="Courier New" panose="02070309020205020404" pitchFamily="49" charset="0"/>
               </a:rPr>
-              <a:t>    +--</a:t>
+              <a:t>   +--</a:t>
             </a:r>
             <a:r>
               <a:rPr lang="en-US" sz="850" dirty="0" err="1">
@@ -8977,7 +8945,7 @@
                 <a:ea typeface="Calibri" panose="020F0502020204030204" pitchFamily="34" charset="0"/>
                 <a:cs typeface="Courier New" panose="02070309020205020404" pitchFamily="49" charset="0"/>
               </a:rPr>
-              <a:t> id   </a:t>
+              <a:t> id             </a:t>
             </a:r>
             <a:r>
               <a:rPr lang="en-US" sz="850" dirty="0" err="1">
@@ -9014,7 +8982,7 @@
                 <a:ea typeface="Calibri" panose="020F0502020204030204" pitchFamily="34" charset="0"/>
                 <a:cs typeface="Courier New" panose="02070309020205020404" pitchFamily="49" charset="0"/>
               </a:rPr>
-              <a:t>    +--</a:t>
+              <a:t>   +--</a:t>
             </a:r>
             <a:r>
               <a:rPr lang="en-US" sz="850" dirty="0" err="1">
@@ -9032,7 +9000,7 @@
                 <a:ea typeface="Calibri" panose="020F0502020204030204" pitchFamily="34" charset="0"/>
                 <a:cs typeface="Courier New" panose="02070309020205020404" pitchFamily="49" charset="0"/>
               </a:rPr>
-              <a:t> description           string</a:t>
+              <a:t> description    string</a:t>
             </a:r>
           </a:p>
           <a:p>
@@ -9054,7 +9022,7 @@
                 <a:ea typeface="Calibri" panose="020F0502020204030204" pitchFamily="34" charset="0"/>
                 <a:cs typeface="Courier New" panose="02070309020205020404" pitchFamily="49" charset="0"/>
               </a:rPr>
-              <a:t>    +--</a:t>
+              <a:t>   +--</a:t>
             </a:r>
             <a:r>
               <a:rPr lang="en-US" sz="850" dirty="0" err="1">
@@ -9072,7 +9040,7 @@
                 <a:ea typeface="Calibri" panose="020F0502020204030204" pitchFamily="34" charset="0"/>
                 <a:cs typeface="Courier New" panose="02070309020205020404" pitchFamily="49" charset="0"/>
               </a:rPr>
-              <a:t> start-time            </a:t>
+              <a:t> start-time     </a:t>
             </a:r>
             <a:r>
               <a:rPr lang="en-US" sz="850" dirty="0" err="1">
@@ -9109,7 +9077,7 @@
                 <a:ea typeface="Calibri" panose="020F0502020204030204" pitchFamily="34" charset="0"/>
                 <a:cs typeface="Courier New" panose="02070309020205020404" pitchFamily="49" charset="0"/>
               </a:rPr>
-              <a:t>    +--</a:t>
+              <a:t>   +--</a:t>
             </a:r>
             <a:r>
               <a:rPr lang="en-US" sz="850" dirty="0" err="1">
@@ -9127,7 +9095,7 @@
                 <a:ea typeface="Calibri" panose="020F0502020204030204" pitchFamily="34" charset="0"/>
                 <a:cs typeface="Courier New" panose="02070309020205020404" pitchFamily="49" charset="0"/>
               </a:rPr>
-              <a:t> end-time              </a:t>
+              <a:t> end-time       </a:t>
             </a:r>
             <a:r>
               <a:rPr lang="en-US" sz="850" dirty="0" err="1">
@@ -9164,7 +9132,7 @@
                 <a:ea typeface="Calibri" panose="020F0502020204030204" pitchFamily="34" charset="0"/>
                 <a:cs typeface="Courier New" panose="02070309020205020404" pitchFamily="49" charset="0"/>
               </a:rPr>
-              <a:t>    +--</a:t>
+              <a:t>   +--</a:t>
             </a:r>
             <a:r>
               <a:rPr lang="en-US" sz="850" dirty="0" err="1">
@@ -9182,7 +9150,7 @@
                 <a:ea typeface="Calibri" panose="020F0502020204030204" pitchFamily="34" charset="0"/>
                 <a:cs typeface="Courier New" panose="02070309020205020404" pitchFamily="49" charset="0"/>
               </a:rPr>
-              <a:t> concern               uint8</a:t>
+              <a:t> symptoms* []</a:t>
             </a:r>
           </a:p>
           <a:p>
@@ -9204,7 +9172,7 @@
                 <a:ea typeface="Calibri" panose="020F0502020204030204" pitchFamily="34" charset="0"/>
                 <a:cs typeface="Courier New" panose="02070309020205020404" pitchFamily="49" charset="0"/>
               </a:rPr>
-              <a:t>    +--</a:t>
+              <a:t>   |  +--</a:t>
             </a:r>
             <a:r>
               <a:rPr lang="en-US" sz="850" dirty="0" err="1">
@@ -9222,7 +9190,7 @@
                 <a:ea typeface="Calibri" panose="020F0502020204030204" pitchFamily="34" charset="0"/>
                 <a:cs typeface="Courier New" panose="02070309020205020404" pitchFamily="49" charset="0"/>
               </a:rPr>
-              <a:t> events* [id]</a:t>
+              <a:t> symptom</a:t>
             </a:r>
           </a:p>
           <a:p>
@@ -9244,7 +9212,7 @@
                 <a:ea typeface="Calibri" panose="020F0502020204030204" pitchFamily="34" charset="0"/>
                 <a:cs typeface="Courier New" panose="02070309020205020404" pitchFamily="49" charset="0"/>
               </a:rPr>
-              <a:t>    |  +--</a:t>
+              <a:t>   |     +--</a:t>
             </a:r>
             <a:r>
               <a:rPr lang="en-US" sz="850" dirty="0" err="1">
@@ -9262,7 +9230,7 @@
                 <a:ea typeface="Calibri" panose="020F0502020204030204" pitchFamily="34" charset="0"/>
                 <a:cs typeface="Courier New" panose="02070309020205020404" pitchFamily="49" charset="0"/>
               </a:rPr>
-              <a:t> id          </a:t>
+              <a:t> id        </a:t>
             </a:r>
             <a:r>
               <a:rPr lang="en-US" sz="850" dirty="0" err="1">
@@ -9299,7 +9267,7 @@
                 <a:ea typeface="Calibri" panose="020F0502020204030204" pitchFamily="34" charset="0"/>
                 <a:cs typeface="Courier New" panose="02070309020205020404" pitchFamily="49" charset="0"/>
               </a:rPr>
-              <a:t>    |  +--</a:t>
+              <a:t>   |     +--</a:t>
             </a:r>
             <a:r>
               <a:rPr lang="en-US" sz="850" dirty="0" err="1">
@@ -9317,142 +9285,7 @@
                 <a:ea typeface="Calibri" panose="020F0502020204030204" pitchFamily="34" charset="0"/>
                 <a:cs typeface="Courier New" panose="02070309020205020404" pitchFamily="49" charset="0"/>
               </a:rPr>
-              <a:t> symptoms* [id]</a:t>
-            </a:r>
-          </a:p>
-          <a:p>
-            <a:pPr marL="0" marR="0">
-              <a:lnSpc>
-                <a:spcPct val="107000"/>
-              </a:lnSpc>
-              <a:spcBef>
-                <a:spcPts val="0"/>
-              </a:spcBef>
-              <a:spcAft>
-                <a:spcPts val="0"/>
-              </a:spcAft>
-            </a:pPr>
-            <a:r>
-              <a:rPr lang="en-US" sz="850" dirty="0">
-                <a:effectLst/>
-                <a:latin typeface="Courier New" panose="02070309020205020404" pitchFamily="49" charset="0"/>
-                <a:ea typeface="Calibri" panose="020F0502020204030204" pitchFamily="34" charset="0"/>
-                <a:cs typeface="Courier New" panose="02070309020205020404" pitchFamily="49" charset="0"/>
-              </a:rPr>
-              <a:t>    |  |  +--</a:t>
-            </a:r>
-            <a:r>
-              <a:rPr lang="en-US" sz="850" dirty="0" err="1">
-                <a:effectLst/>
-                <a:latin typeface="Courier New" panose="02070309020205020404" pitchFamily="49" charset="0"/>
-                <a:ea typeface="Calibri" panose="020F0502020204030204" pitchFamily="34" charset="0"/>
-                <a:cs typeface="Courier New" panose="02070309020205020404" pitchFamily="49" charset="0"/>
-              </a:rPr>
-              <a:t>rw</a:t>
-            </a:r>
-            <a:r>
-              <a:rPr lang="en-US" sz="850" dirty="0">
-                <a:effectLst/>
-                <a:latin typeface="Courier New" panose="02070309020205020404" pitchFamily="49" charset="0"/>
-                <a:ea typeface="Calibri" panose="020F0502020204030204" pitchFamily="34" charset="0"/>
-                <a:cs typeface="Courier New" panose="02070309020205020404" pitchFamily="49" charset="0"/>
-              </a:rPr>
-              <a:t> id            </a:t>
-            </a:r>
-            <a:r>
-              <a:rPr lang="en-US" sz="850" dirty="0" err="1">
-                <a:effectLst/>
-                <a:latin typeface="Courier New" panose="02070309020205020404" pitchFamily="49" charset="0"/>
-                <a:ea typeface="Calibri" panose="020F0502020204030204" pitchFamily="34" charset="0"/>
-                <a:cs typeface="Courier New" panose="02070309020205020404" pitchFamily="49" charset="0"/>
-              </a:rPr>
-              <a:t>yang:uuid</a:t>
-            </a:r>
-            <a:endParaRPr lang="en-US" sz="850" dirty="0">
-              <a:effectLst/>
-              <a:latin typeface="Courier New" panose="02070309020205020404" pitchFamily="49" charset="0"/>
-              <a:ea typeface="Calibri" panose="020F0502020204030204" pitchFamily="34" charset="0"/>
-              <a:cs typeface="Courier New" panose="02070309020205020404" pitchFamily="49" charset="0"/>
-            </a:endParaRPr>
-          </a:p>
-          <a:p>
-            <a:pPr marL="0" marR="0">
-              <a:lnSpc>
-                <a:spcPct val="107000"/>
-              </a:lnSpc>
-              <a:spcBef>
-                <a:spcPts val="0"/>
-              </a:spcBef>
-              <a:spcAft>
-                <a:spcPts val="0"/>
-              </a:spcAft>
-            </a:pPr>
-            <a:r>
-              <a:rPr lang="en-US" sz="850" dirty="0">
-                <a:effectLst/>
-                <a:latin typeface="Courier New" panose="02070309020205020404" pitchFamily="49" charset="0"/>
-                <a:ea typeface="Calibri" panose="020F0502020204030204" pitchFamily="34" charset="0"/>
-                <a:cs typeface="Courier New" panose="02070309020205020404" pitchFamily="49" charset="0"/>
-              </a:rPr>
-              <a:t>    |  |  +--</a:t>
-            </a:r>
-            <a:r>
-              <a:rPr lang="en-US" sz="850" dirty="0" err="1">
-                <a:effectLst/>
-                <a:latin typeface="Courier New" panose="02070309020205020404" pitchFamily="49" charset="0"/>
-                <a:ea typeface="Calibri" panose="020F0502020204030204" pitchFamily="34" charset="0"/>
-                <a:cs typeface="Courier New" panose="02070309020205020404" pitchFamily="49" charset="0"/>
-              </a:rPr>
-              <a:t>rw</a:t>
-            </a:r>
-            <a:r>
-              <a:rPr lang="en-US" sz="850" dirty="0">
-                <a:effectLst/>
-                <a:latin typeface="Courier New" panose="02070309020205020404" pitchFamily="49" charset="0"/>
-                <a:ea typeface="Calibri" panose="020F0502020204030204" pitchFamily="34" charset="0"/>
-                <a:cs typeface="Courier New" panose="02070309020205020404" pitchFamily="49" charset="0"/>
-              </a:rPr>
-              <a:t> symptom</a:t>
-            </a:r>
-          </a:p>
-          <a:p>
-            <a:pPr marL="0" marR="0">
-              <a:lnSpc>
-                <a:spcPct val="107000"/>
-              </a:lnSpc>
-              <a:spcBef>
-                <a:spcPts val="0"/>
-              </a:spcBef>
-              <a:spcAft>
-                <a:spcPts val="0"/>
-              </a:spcAft>
-            </a:pPr>
-            <a:r>
-              <a:rPr lang="en-US" sz="850" dirty="0">
-                <a:effectLst/>
-                <a:latin typeface="Courier New" panose="02070309020205020404" pitchFamily="49" charset="0"/>
-                <a:ea typeface="Calibri" panose="020F0502020204030204" pitchFamily="34" charset="0"/>
-                <a:cs typeface="Courier New" panose="02070309020205020404" pitchFamily="49" charset="0"/>
-              </a:rPr>
-              <a:t>    |  |  |  +--</a:t>
-            </a:r>
-            <a:r>
-              <a:rPr lang="en-US" sz="850" dirty="0" err="1">
-                <a:effectLst/>
-                <a:latin typeface="Courier New" panose="02070309020205020404" pitchFamily="49" charset="0"/>
-                <a:ea typeface="Calibri" panose="020F0502020204030204" pitchFamily="34" charset="0"/>
-                <a:cs typeface="Courier New" panose="02070309020205020404" pitchFamily="49" charset="0"/>
-              </a:rPr>
-              <a:t>rw</a:t>
-            </a:r>
-            <a:r>
-              <a:rPr lang="en-US" sz="850" dirty="0">
-                <a:effectLst/>
-                <a:latin typeface="Courier New" panose="02070309020205020404" pitchFamily="49" charset="0"/>
-                <a:ea typeface="Calibri" panose="020F0502020204030204" pitchFamily="34" charset="0"/>
-                <a:cs typeface="Courier New" panose="02070309020205020404" pitchFamily="49" charset="0"/>
-              </a:rPr>
-              <a:t> id        </a:t>
+              <a:t> event-id  </a:t>
             </a:r>
             <a:r>
               <a:rPr lang="en-US" sz="850" dirty="0" err="1">
@@ -9503,12 +9336,11 @@
             </a:pPr>
             <a:r>
               <a:rPr lang="en-US" sz="850" dirty="0">
-                <a:effectLst/>
                 <a:latin typeface="Courier New" panose="02070309020205020404" pitchFamily="49" charset="0"/>
                 <a:ea typeface="Calibri" panose="020F0502020204030204" pitchFamily="34" charset="0"/>
                 <a:cs typeface="Courier New" panose="02070309020205020404" pitchFamily="49" charset="0"/>
               </a:rPr>
-              <a:t>&lt;continues&gt;</a:t>
+              <a:t>&lt;snip&gt;</a:t>
             </a:r>
           </a:p>
           <a:p>
@@ -9549,7 +9381,7 @@
                 <a:ea typeface="Calibri" panose="020F0502020204030204" pitchFamily="34" charset="0"/>
                 <a:cs typeface="Courier New" panose="02070309020205020404" pitchFamily="49" charset="0"/>
               </a:rPr>
-              <a:t>    |  |  +--</a:t>
+              <a:t>+--</a:t>
             </a:r>
             <a:r>
               <a:rPr lang="en-US" sz="850" dirty="0" err="1">
@@ -9567,7 +9399,29 @@
                 <a:ea typeface="Calibri" panose="020F0502020204030204" pitchFamily="34" charset="0"/>
                 <a:cs typeface="Courier New" panose="02070309020205020404" pitchFamily="49" charset="0"/>
               </a:rPr>
-              <a:t> entity-id?    </a:t>
+              <a:t> source</a:t>
+            </a:r>
+          </a:p>
+          <a:p>
+            <a:pPr marL="0" marR="0">
+              <a:lnSpc>
+                <a:spcPct val="107000"/>
+              </a:lnSpc>
+              <a:spcBef>
+                <a:spcPts val="0"/>
+              </a:spcBef>
+              <a:spcAft>
+                <a:spcPts val="0"/>
+              </a:spcAft>
+            </a:pPr>
+            <a:r>
+              <a:rPr lang="en-US" sz="850" dirty="0">
+                <a:effectLst/>
+                <a:latin typeface="Courier New" panose="02070309020205020404" pitchFamily="49" charset="0"/>
+                <a:ea typeface="Calibri" panose="020F0502020204030204" pitchFamily="34" charset="0"/>
+                <a:cs typeface="Courier New" panose="02070309020205020404" pitchFamily="49" charset="0"/>
+              </a:rPr>
+              <a:t>       +--</a:t>
             </a:r>
             <a:r>
               <a:rPr lang="en-US" sz="850" dirty="0" err="1">
@@ -9576,27 +9430,8 @@
                 <a:ea typeface="Calibri" panose="020F0502020204030204" pitchFamily="34" charset="0"/>
                 <a:cs typeface="Courier New" panose="02070309020205020404" pitchFamily="49" charset="0"/>
               </a:rPr>
-              <a:t>yang:uuid</a:t>
-            </a:r>
-            <a:endParaRPr lang="en-US" sz="850" dirty="0">
-              <a:effectLst/>
-              <a:latin typeface="Courier New" panose="02070309020205020404" pitchFamily="49" charset="0"/>
-              <a:ea typeface="Calibri" panose="020F0502020204030204" pitchFamily="34" charset="0"/>
-              <a:cs typeface="Courier New" panose="02070309020205020404" pitchFamily="49" charset="0"/>
-            </a:endParaRPr>
-          </a:p>
-          <a:p>
-            <a:pPr marL="0" marR="0">
-              <a:lnSpc>
-                <a:spcPct val="107000"/>
-              </a:lnSpc>
-              <a:spcBef>
-                <a:spcPts val="0"/>
-              </a:spcBef>
-              <a:spcAft>
-                <a:spcPts val="0"/>
-              </a:spcAft>
-            </a:pPr>
+              <a:t>rw</a:t>
+            </a:r>
             <a:r>
               <a:rPr lang="en-US" sz="850" dirty="0">
                 <a:effectLst/>
@@ -9604,7 +9439,51 @@
                 <a:ea typeface="Calibri" panose="020F0502020204030204" pitchFamily="34" charset="0"/>
                 <a:cs typeface="Courier New" panose="02070309020205020404" pitchFamily="49" charset="0"/>
               </a:rPr>
-              <a:t>    |  |  +--</a:t>
+              <a:t> (type)</a:t>
+            </a:r>
+          </a:p>
+          <a:p>
+            <a:pPr marL="0" marR="0">
+              <a:lnSpc>
+                <a:spcPct val="107000"/>
+              </a:lnSpc>
+              <a:spcBef>
+                <a:spcPts val="0"/>
+              </a:spcBef>
+              <a:spcAft>
+                <a:spcPts val="0"/>
+              </a:spcAft>
+            </a:pPr>
+            <a:r>
+              <a:rPr lang="en-US" sz="850" dirty="0">
+                <a:effectLst/>
+                <a:latin typeface="Courier New" panose="02070309020205020404" pitchFamily="49" charset="0"/>
+                <a:ea typeface="Calibri" panose="020F0502020204030204" pitchFamily="34" charset="0"/>
+                <a:cs typeface="Courier New" panose="02070309020205020404" pitchFamily="49" charset="0"/>
+              </a:rPr>
+              <a:t>       |  +--:(human)</a:t>
+            </a:r>
+          </a:p>
+          <a:p>
+            <a:pPr marL="0" marR="0">
+              <a:lnSpc>
+                <a:spcPct val="107000"/>
+              </a:lnSpc>
+              <a:spcBef>
+                <a:spcPts val="0"/>
+              </a:spcBef>
+              <a:spcAft>
+                <a:spcPts val="0"/>
+              </a:spcAft>
+            </a:pPr>
+            <a:r>
+              <a:rPr lang="en-US" sz="850" dirty="0">
+                <a:effectLst/>
+                <a:latin typeface="Courier New" panose="02070309020205020404" pitchFamily="49" charset="0"/>
+                <a:ea typeface="Calibri" panose="020F0502020204030204" pitchFamily="34" charset="0"/>
+                <a:cs typeface="Courier New" panose="02070309020205020404" pitchFamily="49" charset="0"/>
+              </a:rPr>
+              <a:t>       |  |  +--</a:t>
             </a:r>
             <a:r>
               <a:rPr lang="en-US" sz="850" dirty="0" err="1">
@@ -9622,7 +9501,51 @@
                 <a:ea typeface="Calibri" panose="020F0502020204030204" pitchFamily="34" charset="0"/>
                 <a:cs typeface="Courier New" panose="02070309020205020404" pitchFamily="49" charset="0"/>
               </a:rPr>
-              <a:t> start-time    </a:t>
+              <a:t> human        empty</a:t>
+            </a:r>
+          </a:p>
+          <a:p>
+            <a:pPr marL="0" marR="0">
+              <a:lnSpc>
+                <a:spcPct val="107000"/>
+              </a:lnSpc>
+              <a:spcBef>
+                <a:spcPts val="0"/>
+              </a:spcBef>
+              <a:spcAft>
+                <a:spcPts val="0"/>
+              </a:spcAft>
+            </a:pPr>
+            <a:r>
+              <a:rPr lang="en-US" sz="850" dirty="0">
+                <a:effectLst/>
+                <a:latin typeface="Courier New" panose="02070309020205020404" pitchFamily="49" charset="0"/>
+                <a:ea typeface="Calibri" panose="020F0502020204030204" pitchFamily="34" charset="0"/>
+                <a:cs typeface="Courier New" panose="02070309020205020404" pitchFamily="49" charset="0"/>
+              </a:rPr>
+              <a:t>       |  +--:(algorithm)</a:t>
+            </a:r>
+          </a:p>
+          <a:p>
+            <a:pPr marL="0" marR="0">
+              <a:lnSpc>
+                <a:spcPct val="107000"/>
+              </a:lnSpc>
+              <a:spcBef>
+                <a:spcPts val="0"/>
+              </a:spcBef>
+              <a:spcAft>
+                <a:spcPts val="0"/>
+              </a:spcAft>
+            </a:pPr>
+            <a:r>
+              <a:rPr lang="en-US" sz="850" dirty="0">
+                <a:effectLst/>
+                <a:latin typeface="Courier New" panose="02070309020205020404" pitchFamily="49" charset="0"/>
+                <a:ea typeface="Calibri" panose="020F0502020204030204" pitchFamily="34" charset="0"/>
+                <a:cs typeface="Courier New" panose="02070309020205020404" pitchFamily="49" charset="0"/>
+              </a:rPr>
+              <a:t>       |     +--</a:t>
             </a:r>
             <a:r>
               <a:rPr lang="en-US" sz="850" dirty="0" err="1">
@@ -9631,27 +9554,8 @@
                 <a:ea typeface="Calibri" panose="020F0502020204030204" pitchFamily="34" charset="0"/>
                 <a:cs typeface="Courier New" panose="02070309020205020404" pitchFamily="49" charset="0"/>
               </a:rPr>
-              <a:t>yang:date-and-time</a:t>
-            </a:r>
-            <a:endParaRPr lang="en-US" sz="850" dirty="0">
-              <a:effectLst/>
-              <a:latin typeface="Courier New" panose="02070309020205020404" pitchFamily="49" charset="0"/>
-              <a:ea typeface="Calibri" panose="020F0502020204030204" pitchFamily="34" charset="0"/>
-              <a:cs typeface="Courier New" panose="02070309020205020404" pitchFamily="49" charset="0"/>
-            </a:endParaRPr>
-          </a:p>
-          <a:p>
-            <a:pPr marL="0" marR="0">
-              <a:lnSpc>
-                <a:spcPct val="107000"/>
-              </a:lnSpc>
-              <a:spcBef>
-                <a:spcPts val="0"/>
-              </a:spcBef>
-              <a:spcAft>
-                <a:spcPts val="0"/>
-              </a:spcAft>
-            </a:pPr>
+              <a:t>rw</a:t>
+            </a:r>
             <a:r>
               <a:rPr lang="en-US" sz="850" dirty="0">
                 <a:effectLst/>
@@ -9659,7 +9563,29 @@
                 <a:ea typeface="Calibri" panose="020F0502020204030204" pitchFamily="34" charset="0"/>
                 <a:cs typeface="Courier New" panose="02070309020205020404" pitchFamily="49" charset="0"/>
               </a:rPr>
-              <a:t>    |  |  +--</a:t>
+              <a:t> algorithm    empty</a:t>
+            </a:r>
+          </a:p>
+          <a:p>
+            <a:pPr marL="0" marR="0">
+              <a:lnSpc>
+                <a:spcPct val="107000"/>
+              </a:lnSpc>
+              <a:spcBef>
+                <a:spcPts val="0"/>
+              </a:spcBef>
+              <a:spcAft>
+                <a:spcPts val="0"/>
+              </a:spcAft>
+            </a:pPr>
+            <a:r>
+              <a:rPr lang="en-US" sz="850" dirty="0">
+                <a:effectLst/>
+                <a:latin typeface="Courier New" panose="02070309020205020404" pitchFamily="49" charset="0"/>
+                <a:ea typeface="Calibri" panose="020F0502020204030204" pitchFamily="34" charset="0"/>
+                <a:cs typeface="Courier New" panose="02070309020205020404" pitchFamily="49" charset="0"/>
+              </a:rPr>
+              <a:t>       +--</a:t>
             </a:r>
             <a:r>
               <a:rPr lang="en-US" sz="850" dirty="0" err="1">
@@ -9677,346 +9603,7 @@
                 <a:ea typeface="Calibri" panose="020F0502020204030204" pitchFamily="34" charset="0"/>
                 <a:cs typeface="Courier New" panose="02070309020205020404" pitchFamily="49" charset="0"/>
               </a:rPr>
-              <a:t> end-time      </a:t>
-            </a:r>
-            <a:r>
-              <a:rPr lang="en-US" sz="850" dirty="0" err="1">
-                <a:effectLst/>
-                <a:latin typeface="Courier New" panose="02070309020205020404" pitchFamily="49" charset="0"/>
-                <a:ea typeface="Calibri" panose="020F0502020204030204" pitchFamily="34" charset="0"/>
-                <a:cs typeface="Courier New" panose="02070309020205020404" pitchFamily="49" charset="0"/>
-              </a:rPr>
-              <a:t>yang:date-and-time</a:t>
-            </a:r>
-            <a:endParaRPr lang="en-US" sz="850" dirty="0">
-              <a:effectLst/>
-              <a:latin typeface="Courier New" panose="02070309020205020404" pitchFamily="49" charset="0"/>
-              <a:ea typeface="Calibri" panose="020F0502020204030204" pitchFamily="34" charset="0"/>
-              <a:cs typeface="Courier New" panose="02070309020205020404" pitchFamily="49" charset="0"/>
-            </a:endParaRPr>
-          </a:p>
-          <a:p>
-            <a:pPr marL="0" marR="0">
-              <a:lnSpc>
-                <a:spcPct val="107000"/>
-              </a:lnSpc>
-              <a:spcBef>
-                <a:spcPts val="0"/>
-              </a:spcBef>
-              <a:spcAft>
-                <a:spcPts val="0"/>
-              </a:spcAft>
-            </a:pPr>
-            <a:r>
-              <a:rPr lang="en-US" sz="850" dirty="0">
-                <a:effectLst/>
-                <a:latin typeface="Courier New" panose="02070309020205020404" pitchFamily="49" charset="0"/>
-                <a:ea typeface="Calibri" panose="020F0502020204030204" pitchFamily="34" charset="0"/>
-                <a:cs typeface="Courier New" panose="02070309020205020404" pitchFamily="49" charset="0"/>
-              </a:rPr>
-              <a:t>    |  |  +--</a:t>
-            </a:r>
-            <a:r>
-              <a:rPr lang="en-US" sz="850" dirty="0" err="1">
-                <a:effectLst/>
-                <a:latin typeface="Courier New" panose="02070309020205020404" pitchFamily="49" charset="0"/>
-                <a:ea typeface="Calibri" panose="020F0502020204030204" pitchFamily="34" charset="0"/>
-                <a:cs typeface="Courier New" panose="02070309020205020404" pitchFamily="49" charset="0"/>
-              </a:rPr>
-              <a:t>rw</a:t>
-            </a:r>
-            <a:r>
-              <a:rPr lang="en-US" sz="850" dirty="0">
-                <a:effectLst/>
-                <a:latin typeface="Courier New" panose="02070309020205020404" pitchFamily="49" charset="0"/>
-                <a:ea typeface="Calibri" panose="020F0502020204030204" pitchFamily="34" charset="0"/>
-                <a:cs typeface="Courier New" panose="02070309020205020404" pitchFamily="49" charset="0"/>
-              </a:rPr>
-              <a:t> concern?      uint8</a:t>
-            </a:r>
-          </a:p>
-          <a:p>
-            <a:pPr marL="0" marR="0">
-              <a:lnSpc>
-                <a:spcPct val="107000"/>
-              </a:lnSpc>
-              <a:spcBef>
-                <a:spcPts val="0"/>
-              </a:spcBef>
-              <a:spcAft>
-                <a:spcPts val="0"/>
-              </a:spcAft>
-            </a:pPr>
-            <a:r>
-              <a:rPr lang="en-US" sz="850" dirty="0">
-                <a:effectLst/>
-                <a:latin typeface="Courier New" panose="02070309020205020404" pitchFamily="49" charset="0"/>
-                <a:ea typeface="Calibri" panose="020F0502020204030204" pitchFamily="34" charset="0"/>
-                <a:cs typeface="Courier New" panose="02070309020205020404" pitchFamily="49" charset="0"/>
-              </a:rPr>
-              <a:t>    |  +--</a:t>
-            </a:r>
-            <a:r>
-              <a:rPr lang="en-US" sz="850" dirty="0" err="1">
-                <a:effectLst/>
-                <a:latin typeface="Courier New" panose="02070309020205020404" pitchFamily="49" charset="0"/>
-                <a:ea typeface="Calibri" panose="020F0502020204030204" pitchFamily="34" charset="0"/>
-                <a:cs typeface="Courier New" panose="02070309020205020404" pitchFamily="49" charset="0"/>
-              </a:rPr>
-              <a:t>rw</a:t>
-            </a:r>
-            <a:r>
-              <a:rPr lang="en-US" sz="850" dirty="0">
-                <a:effectLst/>
-                <a:latin typeface="Courier New" panose="02070309020205020404" pitchFamily="49" charset="0"/>
-                <a:ea typeface="Calibri" panose="020F0502020204030204" pitchFamily="34" charset="0"/>
-                <a:cs typeface="Courier New" panose="02070309020205020404" pitchFamily="49" charset="0"/>
-              </a:rPr>
-              <a:t> source</a:t>
-            </a:r>
-          </a:p>
-          <a:p>
-            <a:pPr marL="0" marR="0">
-              <a:lnSpc>
-                <a:spcPct val="107000"/>
-              </a:lnSpc>
-              <a:spcBef>
-                <a:spcPts val="0"/>
-              </a:spcBef>
-              <a:spcAft>
-                <a:spcPts val="0"/>
-              </a:spcAft>
-            </a:pPr>
-            <a:r>
-              <a:rPr lang="en-US" sz="850" dirty="0">
-                <a:effectLst/>
-                <a:latin typeface="Courier New" panose="02070309020205020404" pitchFamily="49" charset="0"/>
-                <a:ea typeface="Calibri" panose="020F0502020204030204" pitchFamily="34" charset="0"/>
-                <a:cs typeface="Courier New" panose="02070309020205020404" pitchFamily="49" charset="0"/>
-              </a:rPr>
-              <a:t>    |     +--</a:t>
-            </a:r>
-            <a:r>
-              <a:rPr lang="en-US" sz="850" dirty="0" err="1">
-                <a:effectLst/>
-                <a:latin typeface="Courier New" panose="02070309020205020404" pitchFamily="49" charset="0"/>
-                <a:ea typeface="Calibri" panose="020F0502020204030204" pitchFamily="34" charset="0"/>
-                <a:cs typeface="Courier New" panose="02070309020205020404" pitchFamily="49" charset="0"/>
-              </a:rPr>
-              <a:t>rw</a:t>
-            </a:r>
-            <a:r>
-              <a:rPr lang="en-US" sz="850" dirty="0">
-                <a:effectLst/>
-                <a:latin typeface="Courier New" panose="02070309020205020404" pitchFamily="49" charset="0"/>
-                <a:ea typeface="Calibri" panose="020F0502020204030204" pitchFamily="34" charset="0"/>
-                <a:cs typeface="Courier New" panose="02070309020205020404" pitchFamily="49" charset="0"/>
-              </a:rPr>
-              <a:t> (source-type)</a:t>
-            </a:r>
-          </a:p>
-          <a:p>
-            <a:pPr marL="0" marR="0">
-              <a:lnSpc>
-                <a:spcPct val="107000"/>
-              </a:lnSpc>
-              <a:spcBef>
-                <a:spcPts val="0"/>
-              </a:spcBef>
-              <a:spcAft>
-                <a:spcPts val="0"/>
-              </a:spcAft>
-            </a:pPr>
-            <a:r>
-              <a:rPr lang="en-US" sz="850" dirty="0">
-                <a:effectLst/>
-                <a:latin typeface="Courier New" panose="02070309020205020404" pitchFamily="49" charset="0"/>
-                <a:ea typeface="Calibri" panose="020F0502020204030204" pitchFamily="34" charset="0"/>
-                <a:cs typeface="Courier New" panose="02070309020205020404" pitchFamily="49" charset="0"/>
-              </a:rPr>
-              <a:t>    |     |  +--:(human)</a:t>
-            </a:r>
-          </a:p>
-          <a:p>
-            <a:pPr marL="0" marR="0">
-              <a:lnSpc>
-                <a:spcPct val="107000"/>
-              </a:lnSpc>
-              <a:spcBef>
-                <a:spcPts val="0"/>
-              </a:spcBef>
-              <a:spcAft>
-                <a:spcPts val="0"/>
-              </a:spcAft>
-            </a:pPr>
-            <a:r>
-              <a:rPr lang="en-US" sz="850" dirty="0">
-                <a:effectLst/>
-                <a:latin typeface="Courier New" panose="02070309020205020404" pitchFamily="49" charset="0"/>
-                <a:ea typeface="Calibri" panose="020F0502020204030204" pitchFamily="34" charset="0"/>
-                <a:cs typeface="Courier New" panose="02070309020205020404" pitchFamily="49" charset="0"/>
-              </a:rPr>
-              <a:t>    |     |  |  +--</a:t>
-            </a:r>
-            <a:r>
-              <a:rPr lang="en-US" sz="850" dirty="0" err="1">
-                <a:effectLst/>
-                <a:latin typeface="Courier New" panose="02070309020205020404" pitchFamily="49" charset="0"/>
-                <a:ea typeface="Calibri" panose="020F0502020204030204" pitchFamily="34" charset="0"/>
-                <a:cs typeface="Courier New" panose="02070309020205020404" pitchFamily="49" charset="0"/>
-              </a:rPr>
-              <a:t>rw</a:t>
-            </a:r>
-            <a:r>
-              <a:rPr lang="en-US" sz="850" dirty="0">
-                <a:effectLst/>
-                <a:latin typeface="Courier New" panose="02070309020205020404" pitchFamily="49" charset="0"/>
-                <a:ea typeface="Calibri" panose="020F0502020204030204" pitchFamily="34" charset="0"/>
-                <a:cs typeface="Courier New" panose="02070309020205020404" pitchFamily="49" charset="0"/>
-              </a:rPr>
-              <a:t> human        empty</a:t>
-            </a:r>
-          </a:p>
-          <a:p>
-            <a:pPr marL="0" marR="0">
-              <a:lnSpc>
-                <a:spcPct val="107000"/>
-              </a:lnSpc>
-              <a:spcBef>
-                <a:spcPts val="0"/>
-              </a:spcBef>
-              <a:spcAft>
-                <a:spcPts val="0"/>
-              </a:spcAft>
-            </a:pPr>
-            <a:r>
-              <a:rPr lang="en-US" sz="850" dirty="0">
-                <a:effectLst/>
-                <a:latin typeface="Courier New" panose="02070309020205020404" pitchFamily="49" charset="0"/>
-                <a:ea typeface="Calibri" panose="020F0502020204030204" pitchFamily="34" charset="0"/>
-                <a:cs typeface="Courier New" panose="02070309020205020404" pitchFamily="49" charset="0"/>
-              </a:rPr>
-              <a:t>    |     |  +--:(algorithm)</a:t>
-            </a:r>
-          </a:p>
-          <a:p>
-            <a:pPr marL="0" marR="0">
-              <a:lnSpc>
-                <a:spcPct val="107000"/>
-              </a:lnSpc>
-              <a:spcBef>
-                <a:spcPts val="0"/>
-              </a:spcBef>
-              <a:spcAft>
-                <a:spcPts val="0"/>
-              </a:spcAft>
-            </a:pPr>
-            <a:r>
-              <a:rPr lang="en-US" sz="850" dirty="0">
-                <a:effectLst/>
-                <a:latin typeface="Courier New" panose="02070309020205020404" pitchFamily="49" charset="0"/>
-                <a:ea typeface="Calibri" panose="020F0502020204030204" pitchFamily="34" charset="0"/>
-                <a:cs typeface="Courier New" panose="02070309020205020404" pitchFamily="49" charset="0"/>
-              </a:rPr>
-              <a:t>    |     |     +--</a:t>
-            </a:r>
-            <a:r>
-              <a:rPr lang="en-US" sz="850" dirty="0" err="1">
-                <a:effectLst/>
-                <a:latin typeface="Courier New" panose="02070309020205020404" pitchFamily="49" charset="0"/>
-                <a:ea typeface="Calibri" panose="020F0502020204030204" pitchFamily="34" charset="0"/>
-                <a:cs typeface="Courier New" panose="02070309020205020404" pitchFamily="49" charset="0"/>
-              </a:rPr>
-              <a:t>rw</a:t>
-            </a:r>
-            <a:r>
-              <a:rPr lang="en-US" sz="850" dirty="0">
-                <a:effectLst/>
-                <a:latin typeface="Courier New" panose="02070309020205020404" pitchFamily="49" charset="0"/>
-                <a:ea typeface="Calibri" panose="020F0502020204030204" pitchFamily="34" charset="0"/>
-                <a:cs typeface="Courier New" panose="02070309020205020404" pitchFamily="49" charset="0"/>
-              </a:rPr>
-              <a:t> algorithm    empty</a:t>
-            </a:r>
-          </a:p>
-          <a:p>
-            <a:pPr marL="0" marR="0">
-              <a:lnSpc>
-                <a:spcPct val="107000"/>
-              </a:lnSpc>
-              <a:spcBef>
-                <a:spcPts val="0"/>
-              </a:spcBef>
-              <a:spcAft>
-                <a:spcPts val="0"/>
-              </a:spcAft>
-            </a:pPr>
-            <a:r>
-              <a:rPr lang="en-US" sz="850" dirty="0">
-                <a:effectLst/>
-                <a:latin typeface="Courier New" panose="02070309020205020404" pitchFamily="49" charset="0"/>
-                <a:ea typeface="Calibri" panose="020F0502020204030204" pitchFamily="34" charset="0"/>
-                <a:cs typeface="Courier New" panose="02070309020205020404" pitchFamily="49" charset="0"/>
-              </a:rPr>
-              <a:t>    |     +--</a:t>
-            </a:r>
-            <a:r>
-              <a:rPr lang="en-US" sz="850" dirty="0" err="1">
-                <a:effectLst/>
-                <a:latin typeface="Courier New" panose="02070309020205020404" pitchFamily="49" charset="0"/>
-                <a:ea typeface="Calibri" panose="020F0502020204030204" pitchFamily="34" charset="0"/>
-                <a:cs typeface="Courier New" panose="02070309020205020404" pitchFamily="49" charset="0"/>
-              </a:rPr>
-              <a:t>rw</a:t>
-            </a:r>
-            <a:r>
-              <a:rPr lang="en-US" sz="850" dirty="0">
-                <a:effectLst/>
-                <a:latin typeface="Courier New" panose="02070309020205020404" pitchFamily="49" charset="0"/>
-                <a:ea typeface="Calibri" panose="020F0502020204030204" pitchFamily="34" charset="0"/>
-                <a:cs typeface="Courier New" panose="02070309020205020404" pitchFamily="49" charset="0"/>
-              </a:rPr>
               <a:t> name?              string</a:t>
-            </a:r>
-          </a:p>
-          <a:p>
-            <a:pPr marL="0" marR="0">
-              <a:lnSpc>
-                <a:spcPct val="107000"/>
-              </a:lnSpc>
-              <a:spcBef>
-                <a:spcPts val="0"/>
-              </a:spcBef>
-              <a:spcAft>
-                <a:spcPts val="0"/>
-              </a:spcAft>
-            </a:pPr>
-            <a:r>
-              <a:rPr lang="en-US" sz="850" dirty="0">
-                <a:effectLst/>
-                <a:latin typeface="Courier New" panose="02070309020205020404" pitchFamily="49" charset="0"/>
-                <a:ea typeface="Calibri" panose="020F0502020204030204" pitchFamily="34" charset="0"/>
-                <a:cs typeface="Courier New" panose="02070309020205020404" pitchFamily="49" charset="0"/>
-              </a:rPr>
-              <a:t>    +--</a:t>
-            </a:r>
-            <a:r>
-              <a:rPr lang="en-US" sz="850" dirty="0" err="1">
-                <a:effectLst/>
-                <a:latin typeface="Courier New" panose="02070309020205020404" pitchFamily="49" charset="0"/>
-                <a:ea typeface="Calibri" panose="020F0502020204030204" pitchFamily="34" charset="0"/>
-                <a:cs typeface="Courier New" panose="02070309020205020404" pitchFamily="49" charset="0"/>
-              </a:rPr>
-              <a:t>rw</a:t>
-            </a:r>
-            <a:r>
-              <a:rPr lang="en-US" sz="850" dirty="0">
-                <a:effectLst/>
-                <a:latin typeface="Courier New" panose="02070309020205020404" pitchFamily="49" charset="0"/>
-                <a:ea typeface="Calibri" panose="020F0502020204030204" pitchFamily="34" charset="0"/>
-                <a:cs typeface="Courier New" panose="02070309020205020404" pitchFamily="49" charset="0"/>
-              </a:rPr>
-              <a:t> remediation-action?   string</a:t>
             </a:r>
           </a:p>
         </p:txBody>
@@ -10036,7 +9623,7 @@
         <p:spPr>
           <a:xfrm>
             <a:off x="838198" y="1867493"/>
-            <a:ext cx="4182687" cy="2625064"/>
+            <a:ext cx="4182687" cy="701140"/>
           </a:xfrm>
           <a:prstGeom prst="rect">
             <a:avLst/>
@@ -10079,10 +9666,10 @@
       </p:sp>
       <p:sp>
         <p:nvSpPr>
-          <p:cNvPr id="7" name="Rectangle 6">
+          <p:cNvPr id="8" name="Rectangle 7">
             <a:extLst>
               <a:ext uri="{FF2B5EF4-FFF2-40B4-BE49-F238E27FC236}">
-                <a16:creationId xmlns:a16="http://schemas.microsoft.com/office/drawing/2014/main" id="{E751AA3A-A181-4E76-CC75-041686EB2C20}"/>
+                <a16:creationId xmlns:a16="http://schemas.microsoft.com/office/drawing/2014/main" id="{8F5B7433-6C2C-9F79-E743-B4F7F3199C49}"/>
               </a:ext>
             </a:extLst>
           </p:cNvPr>
@@ -10091,63 +9678,7 @@
         </p:nvSpPr>
         <p:spPr>
           <a:xfrm>
-            <a:off x="838196" y="2997103"/>
-            <a:ext cx="4182687" cy="549680"/>
-          </a:xfrm>
-          <a:prstGeom prst="rect">
-            <a:avLst/>
-          </a:prstGeom>
-          <a:solidFill>
-            <a:schemeClr val="accent4">
-              <a:alpha val="10000"/>
-            </a:schemeClr>
-          </a:solidFill>
-          <a:ln w="25400">
-            <a:solidFill>
-              <a:schemeClr val="accent4"/>
-            </a:solidFill>
-          </a:ln>
-        </p:spPr>
-        <p:style>
-          <a:lnRef idx="2">
-            <a:schemeClr val="accent1">
-              <a:shade val="50000"/>
-            </a:schemeClr>
-          </a:lnRef>
-          <a:fillRef idx="1">
-            <a:schemeClr val="accent1"/>
-          </a:fillRef>
-          <a:effectRef idx="0">
-            <a:schemeClr val="accent1"/>
-          </a:effectRef>
-          <a:fontRef idx="minor">
-            <a:schemeClr val="lt1"/>
-          </a:fontRef>
-        </p:style>
-        <p:txBody>
-          <a:bodyPr rtlCol="0" anchor="ctr"/>
-          <a:lstStyle/>
-          <a:p>
-            <a:pPr algn="ctr"/>
-            <a:endParaRPr lang="de-CH" dirty="0"/>
-          </a:p>
-        </p:txBody>
-      </p:sp>
-      <p:sp>
-        <p:nvSpPr>
-          <p:cNvPr id="8" name="Rectangle 7">
-            <a:extLst>
-              <a:ext uri="{FF2B5EF4-FFF2-40B4-BE49-F238E27FC236}">
-                <a16:creationId xmlns:a16="http://schemas.microsoft.com/office/drawing/2014/main" id="{8F5B7433-6C2C-9F79-E743-B4F7F3199C49}"/>
-              </a:ext>
-            </a:extLst>
-          </p:cNvPr>
-          <p:cNvSpPr/>
-          <p:nvPr/>
-        </p:nvSpPr>
-        <p:spPr>
-          <a:xfrm>
-            <a:off x="838195" y="4492557"/>
+            <a:off x="838193" y="3575561"/>
             <a:ext cx="4182687" cy="985133"/>
           </a:xfrm>
           <a:prstGeom prst="rect">
@@ -10292,8 +9823,8 @@
         </p:nvCxnSpPr>
         <p:spPr>
           <a:xfrm flipV="1">
-            <a:off x="5020880" y="2053850"/>
-            <a:ext cx="1263542" cy="362667"/>
+            <a:off x="5020880" y="2128058"/>
+            <a:ext cx="1172530" cy="288459"/>
           </a:xfrm>
           <a:prstGeom prst="line">
             <a:avLst/>
@@ -10335,8 +9866,8 @@
         </p:nvCxnSpPr>
         <p:spPr>
           <a:xfrm flipV="1">
-            <a:off x="5020880" y="3723588"/>
-            <a:ext cx="1263539" cy="1173516"/>
+            <a:off x="5020880" y="3715789"/>
+            <a:ext cx="1172530" cy="374426"/>
           </a:xfrm>
           <a:prstGeom prst="line">
             <a:avLst/>
@@ -10378,8 +9909,8 @@
         </p:nvCxnSpPr>
         <p:spPr>
           <a:xfrm flipV="1">
-            <a:off x="5020880" y="2762054"/>
-            <a:ext cx="1263539" cy="472359"/>
+            <a:off x="5020880" y="2779527"/>
+            <a:ext cx="1238604" cy="454886"/>
           </a:xfrm>
           <a:prstGeom prst="line">
             <a:avLst/>
@@ -10471,8 +10002,76 @@
             </a:r>
             <a:r>
               <a:rPr lang="en-US" sz="2000" dirty="0"/>
-              <a:t>describes who detected the outlier. A human or a network anomaly detection system.</a:t>
-            </a:r>
+              <a:t>describes which system </a:t>
+            </a:r>
+            <a:r>
+              <a:rPr lang="en-US" sz="2000" b="1" dirty="0">
+                <a:solidFill>
+                  <a:srgbClr val="FF0000"/>
+                </a:solidFill>
+              </a:rPr>
+              <a:t>reported</a:t>
+            </a:r>
+            <a:r>
+              <a:rPr lang="en-US" sz="2000" dirty="0"/>
+              <a:t> the outlier. A human or a network anomaly detection system.</a:t>
+            </a:r>
+          </a:p>
+        </p:txBody>
+      </p:sp>
+      <p:sp>
+        <p:nvSpPr>
+          <p:cNvPr id="2" name="Rectangle 1">
+            <a:extLst>
+              <a:ext uri="{FF2B5EF4-FFF2-40B4-BE49-F238E27FC236}">
+                <a16:creationId xmlns:a16="http://schemas.microsoft.com/office/drawing/2014/main" id="{DCEA7400-67FD-49E0-B60E-80B637536456}"/>
+              </a:ext>
+            </a:extLst>
+          </p:cNvPr>
+          <p:cNvSpPr/>
+          <p:nvPr/>
+        </p:nvSpPr>
+        <p:spPr>
+          <a:xfrm>
+            <a:off x="838195" y="2570861"/>
+            <a:ext cx="4182687" cy="985133"/>
+          </a:xfrm>
+          <a:prstGeom prst="rect">
+            <a:avLst/>
+          </a:prstGeom>
+          <a:solidFill>
+            <a:schemeClr val="accent4">
+              <a:alpha val="10000"/>
+            </a:schemeClr>
+          </a:solidFill>
+          <a:ln w="25400">
+            <a:solidFill>
+              <a:schemeClr val="accent4"/>
+            </a:solidFill>
+          </a:ln>
+        </p:spPr>
+        <p:style>
+          <a:lnRef idx="2">
+            <a:schemeClr val="accent1">
+              <a:shade val="50000"/>
+            </a:schemeClr>
+          </a:lnRef>
+          <a:fillRef idx="1">
+            <a:schemeClr val="accent1"/>
+          </a:fillRef>
+          <a:effectRef idx="0">
+            <a:schemeClr val="accent1"/>
+          </a:effectRef>
+          <a:fontRef idx="minor">
+            <a:schemeClr val="lt1"/>
+          </a:fontRef>
+        </p:style>
+        <p:txBody>
+          <a:bodyPr rtlCol="0" anchor="ctr"/>
+          <a:lstStyle/>
+          <a:p>
+            <a:pPr algn="ctr"/>
+            <a:endParaRPr lang="de-CH"/>
           </a:p>
         </p:txBody>
       </p:sp>
@@ -10907,7 +10506,7 @@
               <a:rPr lang="de-CH" sz="2500" dirty="0">
                 <a:latin typeface="+mj-lt"/>
               </a:rPr>
-              <a:t>01. </a:t>
+              <a:t>04. </a:t>
             </a:r>
             <a:r>
               <a:rPr lang="de-CH" sz="2500" dirty="0">
@@ -16116,17 +15715,7 @@
             </a:r>
             <a:r>
               <a:rPr lang="en-US" sz="2800" dirty="0"/>
-              <a:t>A more </a:t>
-            </a:r>
-            <a:r>
-              <a:rPr lang="en-US" sz="2800" dirty="0">
-                <a:hlinkClick r:id="rId2"/>
-              </a:rPr>
-              <a:t>detailing paper </a:t>
-            </a:r>
-            <a:r>
-              <a:rPr lang="en-US" sz="2800" dirty="0"/>
-              <a:t>was submitted to IEEE Transactions on Network and Service Management</a:t>
+              <a:t>A more detailing paper will be submitted soon to IEEE Transactions on Network and Service Management</a:t>
             </a:r>
             <a:r>
               <a:rPr lang="de-CH" sz="3000" b="1" dirty="0">
@@ -16208,7 +15797,7 @@
           <p:nvPr/>
         </p:nvPicPr>
         <p:blipFill>
-          <a:blip r:embed="rId3"/>
+          <a:blip r:embed="rId2"/>
           <a:stretch>
             <a:fillRect/>
           </a:stretch>
@@ -16767,7 +16356,7 @@
         </p:nvSpPr>
         <p:spPr bwMode="black">
           <a:xfrm>
-            <a:off x="960120" y="2011679"/>
+            <a:off x="942679" y="2011679"/>
             <a:ext cx="6364224" cy="4171630"/>
           </a:xfrm>
           <a:prstGeom prst="rect">
@@ -16974,11 +16563,11 @@
                   <a:srgbClr val="FF0000"/>
                 </a:solidFill>
               </a:rPr>
-              <a:t>Global outliers:  </a:t>
+              <a:t>Action: </a:t>
             </a:r>
             <a:r>
               <a:rPr lang="en-US" dirty="0"/>
-              <a:t>An outlier is considered "global" if its behavior is outside the entirety of the considered data set.</a:t>
+              <a:t>Which action the network node performed for a packet in the forwarding plane, a path or adjacency in the control plane or state or statistical changes in the management plane.</a:t>
             </a:r>
           </a:p>
           <a:p>
@@ -16988,11 +16577,11 @@
                   <a:srgbClr val="FF0000"/>
                 </a:solidFill>
               </a:rPr>
-              <a:t>Contextual outliers:  </a:t>
+              <a:t>Reason: </a:t>
             </a:r>
             <a:r>
               <a:rPr lang="en-US" dirty="0"/>
-              <a:t>An outlier is considered "contextual" if its behavior is within a normal (expected) range, but it would not be expected based on some context.  Context can be defined as a function of multiple parameters, such as time, location, etc.</a:t>
+              <a:t>For each reason one or more actions describing why this action was used. From drop unreachable, administered, and corrupt in forwarding plane, to reachability withdraw and adjacency teared down in control plane, to Interface down, errors or discard in management plane.</a:t>
             </a:r>
           </a:p>
           <a:p>
@@ -17002,11 +16591,11 @@
                   <a:srgbClr val="FF0000"/>
                 </a:solidFill>
               </a:rPr>
-              <a:t>Collective outliers:  </a:t>
+              <a:t>Cause: </a:t>
             </a:r>
             <a:r>
               <a:rPr lang="en-US" dirty="0"/>
-              <a:t>An outlier is considered "collective" if the behavior of each single data point that are part of the anomaly are within expected ranges (so they are not anomalous, it’s either a contextual or a global sense), but the group taking all the data points together, is.</a:t>
+              <a:t>For each reason one or more causes describes why the action was chosen. From missing next-hop and link-layer information in forwarding plane, to reachability withdrawn due to peer down or path no longer redistributed.</a:t>
             </a:r>
           </a:p>
         </p:txBody>
@@ -17026,7 +16615,7 @@
         <p:spPr>
           <a:xfrm>
             <a:off x="7589520" y="2365150"/>
-            <a:ext cx="4404495" cy="3323987"/>
+            <a:ext cx="4333008" cy="2400657"/>
           </a:xfrm>
           <a:prstGeom prst="rect">
             <a:avLst/>
@@ -17044,7 +16633,7 @@
               <a:rPr lang="en-US" sz="3000" b="1" dirty="0">
                 <a:latin typeface="+mj-lt"/>
               </a:rPr>
-              <a:t>« </a:t>
+              <a:t>« Symptoms are categorized in </a:t>
             </a:r>
             <a:r>
               <a:rPr lang="en-US" sz="3000" b="1" dirty="0">
@@ -17053,13 +16642,13 @@
                 </a:solidFill>
                 <a:latin typeface="+mj-lt"/>
               </a:rPr>
-              <a:t>Collective outliers </a:t>
+              <a:t>which plane </a:t>
             </a:r>
             <a:r>
               <a:rPr lang="en-US" sz="3000" b="1" dirty="0">
                 <a:latin typeface="+mj-lt"/>
               </a:rPr>
-              <a:t>are important because networks are connected. Through </a:t>
+              <a:t>they have been </a:t>
             </a:r>
             <a:r>
               <a:rPr lang="en-US" sz="3000" b="1" dirty="0">
@@ -17068,13 +16657,13 @@
                 </a:solidFill>
                 <a:latin typeface="+mj-lt"/>
               </a:rPr>
-              <a:t>different planes interconnected</a:t>
+              <a:t>observed</a:t>
             </a:r>
             <a:r>
               <a:rPr lang="en-US" sz="3000" b="1" dirty="0">
                 <a:latin typeface="+mj-lt"/>
               </a:rPr>
-              <a:t> symptoms </a:t>
+              <a:t>, their </a:t>
             </a:r>
             <a:r>
               <a:rPr lang="en-US" sz="3000" b="1" dirty="0">
@@ -17083,22 +16672,7 @@
                 </a:solidFill>
                 <a:latin typeface="+mj-lt"/>
               </a:rPr>
-              <a:t>from various angles </a:t>
-            </a:r>
-            <a:r>
-              <a:rPr lang="en-US" sz="3000" b="1" dirty="0">
-                <a:latin typeface="+mj-lt"/>
-              </a:rPr>
-              <a:t>can be observed</a:t>
-            </a:r>
-            <a:r>
-              <a:rPr lang="en-US" sz="3000" b="1" dirty="0">
-                <a:solidFill>
-                  <a:schemeClr val="accent6"/>
-                </a:solidFill>
-                <a:latin typeface="+mj-lt"/>
-              </a:rPr>
-              <a:t> </a:t>
+              <a:t>action, reason and cause </a:t>
             </a:r>
             <a:r>
               <a:rPr lang="de-CH" sz="3000" b="1" dirty="0">
@@ -17142,7 +16716,7 @@
           <a:p>
             <a:r>
               <a:rPr lang="en-US" sz="2800" b="1" dirty="0"/>
-              <a:t>What is an outlier and how to categorize them</a:t>
+              <a:t>What is a symptom and how to categorize them</a:t>
             </a:r>
             <a:br>
               <a:rPr lang="en-US" sz="3600" dirty="0"/>
@@ -17155,7 +16729,7 @@
                   </a:schemeClr>
                 </a:solidFill>
               </a:rPr>
-              <a:t>From global to contextual to collective</a:t>
+              <a:t>From action to reason to cause</a:t>
             </a:r>
           </a:p>
         </p:txBody>
@@ -17163,7 +16737,7 @@
     </p:spTree>
     <p:extLst>
       <p:ext uri="{BB962C8B-B14F-4D97-AF65-F5344CB8AC3E}">
-        <p14:creationId xmlns:p14="http://schemas.microsoft.com/office/powerpoint/2010/main" val="4235116615"/>
+        <p14:creationId xmlns:p14="http://schemas.microsoft.com/office/powerpoint/2010/main" val="508096634"/>
       </p:ext>
     </p:extLst>
   </p:cSld>
@@ -17240,8 +16814,8 @@
         </p:nvSpPr>
         <p:spPr bwMode="black">
           <a:xfrm>
-            <a:off x="942679" y="2011679"/>
-            <a:ext cx="6364224" cy="4171630"/>
+            <a:off x="970961" y="2011679"/>
+            <a:ext cx="9486450" cy="4171630"/>
           </a:xfrm>
           <a:prstGeom prst="rect">
             <a:avLst/>
@@ -17447,11 +17021,11 @@
                   <a:srgbClr val="FF0000"/>
                 </a:solidFill>
               </a:rPr>
-              <a:t>Action: </a:t>
+              <a:t>Network Operators: </a:t>
             </a:r>
             <a:r>
               <a:rPr lang="en-US" dirty="0"/>
-              <a:t>Which action the network node performed for a packet in the forwarding plane, a path or adjacency in the control plane or state or statistical changes in the management plane.</a:t>
+              <a:t>Do you agree that today’s actions; traffic is dropped, path is withdrawn and interface down, are always exposed through Network Telemetry. But reasons and causes, dropped due to unreachable next-hop, withdrawn due to peer down, interface down due to missing signal, are rarely exposed to telemetry  would be most interesting?</a:t>
             </a:r>
           </a:p>
           <a:p>
@@ -17461,11 +17035,11 @@
                   <a:srgbClr val="FF0000"/>
                 </a:solidFill>
               </a:rPr>
-              <a:t>Reason: </a:t>
+              <a:t>Network Vendors: </a:t>
             </a:r>
             <a:r>
               <a:rPr lang="en-US" dirty="0"/>
-              <a:t>For each action one or more reasons describing why this action was used. From drop unreachable, administered, and corrupt in forwarding plane, to reachability withdraw and adjacency teared down in control plane, to Interface down, errors or discard in management plane.</a:t>
+              <a:t>Is the assumption correct that a when network service process, routing process and withdrawing a path occur, most of the time the vendor knows why it acts that way, and could potential make this reason and cause information available?</a:t>
             </a:r>
           </a:p>
           <a:p>
@@ -17475,98 +17049,26 @@
                   <a:srgbClr val="FF0000"/>
                 </a:solidFill>
               </a:rPr>
-              <a:t>Relation: </a:t>
+              <a:t>Academia: </a:t>
             </a:r>
             <a:r>
               <a:rPr lang="en-US" dirty="0"/>
-              <a:t>For each reason one or more relation describes the cause why the action was chosen. From missing next-hop and link-layer information in forwarding plane, to reachability withdrawn due to peer down or path no longer redistributed.</a:t>
-            </a:r>
-          </a:p>
-        </p:txBody>
-      </p:sp>
-      <p:sp>
-        <p:nvSpPr>
-          <p:cNvPr id="18" name="TextBox 17">
-            <a:extLst>
-              <a:ext uri="{FF2B5EF4-FFF2-40B4-BE49-F238E27FC236}">
-                <a16:creationId xmlns:a16="http://schemas.microsoft.com/office/drawing/2014/main" id="{B283EDB4-CFDF-D6B9-8AF9-9CFA563360E3}"/>
-              </a:ext>
-            </a:extLst>
-          </p:cNvPr>
-          <p:cNvSpPr txBox="1"/>
-          <p:nvPr/>
-        </p:nvSpPr>
-        <p:spPr>
-          <a:xfrm>
-            <a:off x="7589520" y="2365150"/>
-            <a:ext cx="4333008" cy="2400657"/>
-          </a:xfrm>
-          <a:prstGeom prst="rect">
-            <a:avLst/>
-          </a:prstGeom>
-          <a:noFill/>
-        </p:spPr>
-        <p:txBody>
-          <a:bodyPr wrap="square">
-            <a:spAutoFit/>
-          </a:bodyPr>
-          <a:lstStyle/>
-          <a:p>
-            <a:pPr algn="ctr"/>
-            <a:r>
-              <a:rPr lang="en-US" sz="3000" b="1" dirty="0">
-                <a:latin typeface="+mj-lt"/>
-              </a:rPr>
-              <a:t>« Symptoms are categorized in </a:t>
-            </a:r>
-            <a:r>
-              <a:rPr lang="en-US" sz="3000" b="1" dirty="0">
+              <a:t>Would it help if network operators would provide well defined labeled operational and analytical data to enable and validate their research?</a:t>
+            </a:r>
+          </a:p>
+          <a:p>
+            <a:r>
+              <a:rPr lang="en-US" b="1" dirty="0">
                 <a:solidFill>
                   <a:srgbClr val="FF0000"/>
                 </a:solidFill>
-                <a:latin typeface="+mj-lt"/>
-              </a:rPr>
-              <a:t>which plane </a:t>
-            </a:r>
-            <a:r>
-              <a:rPr lang="en-US" sz="3000" b="1" dirty="0">
-                <a:latin typeface="+mj-lt"/>
-              </a:rPr>
-              <a:t>they have been </a:t>
-            </a:r>
-            <a:r>
-              <a:rPr lang="en-US" sz="3000" b="1" dirty="0">
-                <a:solidFill>
-                  <a:srgbClr val="FF0000"/>
-                </a:solidFill>
-                <a:latin typeface="+mj-lt"/>
-              </a:rPr>
-              <a:t>observed</a:t>
-            </a:r>
-            <a:r>
-              <a:rPr lang="en-US" sz="3000" b="1" dirty="0">
-                <a:latin typeface="+mj-lt"/>
-              </a:rPr>
-              <a:t>, their </a:t>
-            </a:r>
-            <a:r>
-              <a:rPr lang="en-US" sz="3000" b="1" dirty="0">
-                <a:solidFill>
-                  <a:srgbClr val="FF0000"/>
-                </a:solidFill>
-                <a:latin typeface="+mj-lt"/>
-              </a:rPr>
-              <a:t>action, reason and cause </a:t>
-            </a:r>
-            <a:r>
-              <a:rPr lang="de-CH" sz="3000" b="1" dirty="0">
-                <a:latin typeface="+mj-lt"/>
-              </a:rPr>
-              <a:t>»</a:t>
-            </a:r>
-            <a:endParaRPr lang="en-US" sz="3000" b="1" dirty="0">
-              <a:latin typeface="+mj-lt"/>
-            </a:endParaRPr>
+              </a:rPr>
+              <a:t>Everybody: </a:t>
+            </a:r>
+            <a:r>
+              <a:rPr lang="en-US" dirty="0"/>
+              <a:t>Should these symptoms be clearly described and standardized for a common terminology so that operators, researchers and anomaly detection systems alike understand their meaning and learn and act accordingly?</a:t>
+            </a:r>
           </a:p>
         </p:txBody>
       </p:sp>
@@ -17600,7 +17102,7 @@
           <a:p>
             <a:r>
               <a:rPr lang="en-US" sz="2800" b="1" dirty="0"/>
-              <a:t>What is a symptom and how to categorize them</a:t>
+              <a:t>Questions to the audience</a:t>
             </a:r>
             <a:br>
               <a:rPr lang="en-US" sz="3600" dirty="0"/>
@@ -17613,15 +17115,20 @@
                   </a:schemeClr>
                 </a:solidFill>
               </a:rPr>
-              <a:t>From action to reason to relation</a:t>
-            </a:r>
+              <a:t>Do you care?</a:t>
+            </a:r>
+            <a:endParaRPr lang="en-US" sz="2700" dirty="0">
+              <a:solidFill>
+                <a:srgbClr val="FF0000"/>
+              </a:solidFill>
+            </a:endParaRPr>
           </a:p>
         </p:txBody>
       </p:sp>
     </p:spTree>
     <p:extLst>
       <p:ext uri="{BB962C8B-B14F-4D97-AF65-F5344CB8AC3E}">
-        <p14:creationId xmlns:p14="http://schemas.microsoft.com/office/powerpoint/2010/main" val="508096634"/>
+        <p14:creationId xmlns:p14="http://schemas.microsoft.com/office/powerpoint/2010/main" val="1609255611"/>
       </p:ext>
     </p:extLst>
   </p:cSld>

</xml_diff>